<commit_message>
Final revisions for design week
</commit_message>
<xml_diff>
--- a/Documentation/Design Document/UnityDesignPresentation.pptx
+++ b/Documentation/Design Document/UnityDesignPresentation.pptx
@@ -5,21 +5,20 @@
     <p:sldMasterId id="2147483648" r:id="rId1"/>
   </p:sldMasterIdLst>
   <p:handoutMasterIdLst>
-    <p:handoutMasterId r:id="rId14"/>
+    <p:handoutMasterId r:id="rId13"/>
   </p:handoutMasterIdLst>
   <p:sldIdLst>
     <p:sldId id="256" r:id="rId2"/>
-    <p:sldId id="264" r:id="rId3"/>
-    <p:sldId id="277" r:id="rId4"/>
-    <p:sldId id="265" r:id="rId5"/>
-    <p:sldId id="267" r:id="rId6"/>
+    <p:sldId id="277" r:id="rId3"/>
+    <p:sldId id="265" r:id="rId4"/>
+    <p:sldId id="267" r:id="rId5"/>
+    <p:sldId id="278" r:id="rId6"/>
     <p:sldId id="273" r:id="rId7"/>
     <p:sldId id="268" r:id="rId8"/>
     <p:sldId id="275" r:id="rId9"/>
-    <p:sldId id="270" r:id="rId10"/>
-    <p:sldId id="271" r:id="rId11"/>
-    <p:sldId id="272" r:id="rId12"/>
-    <p:sldId id="274" r:id="rId13"/>
+    <p:sldId id="271" r:id="rId10"/>
+    <p:sldId id="279" r:id="rId11"/>
+    <p:sldId id="274" r:id="rId12"/>
   </p:sldIdLst>
   <p:sldSz cx="12192000" cy="6858000"/>
   <p:notesSz cx="9312275" cy="6858000"/>
@@ -220,7 +219,7 @@
           <a:p>
             <a:fld id="{36F12CB1-DABA-4CBD-967D-6A1DEAF14A26}" type="datetimeFigureOut">
               <a:rPr lang="en-US" smtClean="0"/>
-              <a:t>3/9/2015</a:t>
+              <a:t>3/10/2015</a:t>
             </a:fld>
             <a:endParaRPr lang="en-US"/>
           </a:p>
@@ -529,7 +528,7 @@
           <a:p>
             <a:fld id="{4BDF68E2-58F2-4D09-BE8B-E3BD06533059}" type="datetimeFigureOut">
               <a:rPr lang="en-US" dirty="0"/>
-              <a:t>3/9/2015</a:t>
+              <a:t>3/10/2015</a:t>
             </a:fld>
             <a:endParaRPr lang="en-US" dirty="0"/>
           </a:p>
@@ -732,7 +731,7 @@
           <a:p>
             <a:fld id="{2E2D6473-DF6D-4702-B328-E0DD40540A4E}" type="datetimeFigureOut">
               <a:rPr lang="en-US" dirty="0"/>
-              <a:t>3/9/2015</a:t>
+              <a:t>3/10/2015</a:t>
             </a:fld>
             <a:endParaRPr lang="en-US" dirty="0"/>
           </a:p>
@@ -983,7 +982,7 @@
           <a:p>
             <a:fld id="{E26F7E3A-B166-407D-9866-32884E7D5B37}" type="datetimeFigureOut">
               <a:rPr lang="en-US" dirty="0"/>
-              <a:t>3/9/2015</a:t>
+              <a:t>3/10/2015</a:t>
             </a:fld>
             <a:endParaRPr lang="en-US" dirty="0"/>
           </a:p>
@@ -1152,7 +1151,7 @@
           <a:p>
             <a:fld id="{528FC5F6-F338-4AE4-BB23-26385BCFC423}" type="datetimeFigureOut">
               <a:rPr lang="en-US" dirty="0"/>
-              <a:t>3/9/2015</a:t>
+              <a:t>3/10/2015</a:t>
             </a:fld>
             <a:endParaRPr lang="en-US" dirty="0"/>
           </a:p>
@@ -1490,7 +1489,7 @@
           <a:p>
             <a:fld id="{20EBB0C4-6273-4C6E-B9BD-2EDC30F1CD52}" type="datetimeFigureOut">
               <a:rPr lang="en-US" dirty="0"/>
-              <a:t>3/9/2015</a:t>
+              <a:t>3/10/2015</a:t>
             </a:fld>
             <a:endParaRPr lang="en-US" dirty="0"/>
           </a:p>
@@ -1760,7 +1759,7 @@
           <a:p>
             <a:fld id="{19AB4D41-86C1-4908-B66A-0B50CEB3BF29}" type="datetimeFigureOut">
               <a:rPr lang="en-US" dirty="0"/>
-              <a:t>3/9/2015</a:t>
+              <a:t>3/10/2015</a:t>
             </a:fld>
             <a:endParaRPr lang="en-US" dirty="0"/>
           </a:p>
@@ -2134,7 +2133,7 @@
           <a:p>
             <a:fld id="{E6426E2C-56C1-4E0D-A793-0088A7FDD37E}" type="datetimeFigureOut">
               <a:rPr lang="en-US" dirty="0"/>
-              <a:t>3/9/2015</a:t>
+              <a:t>3/10/2015</a:t>
             </a:fld>
             <a:endParaRPr lang="en-US" dirty="0"/>
           </a:p>
@@ -2247,7 +2246,7 @@
           <a:p>
             <a:fld id="{C8C39B41-D8B5-4052-B551-9B5525EAA8B6}" type="datetimeFigureOut">
               <a:rPr lang="en-US" dirty="0"/>
-              <a:t>3/9/2015</a:t>
+              <a:t>3/10/2015</a:t>
             </a:fld>
             <a:endParaRPr lang="en-US" dirty="0"/>
           </a:p>
@@ -2413,7 +2412,7 @@
           <a:p>
             <a:fld id="{4D94136C-8742-45B2-AF27-D93DF72833A9}" type="datetimeFigureOut">
               <a:rPr lang="en-US" dirty="0"/>
-              <a:t>3/9/2015</a:t>
+              <a:t>3/10/2015</a:t>
             </a:fld>
             <a:endParaRPr lang="en-US" dirty="0"/>
           </a:p>
@@ -2763,7 +2762,7 @@
           <a:p>
             <a:fld id="{32ABBEA6-7C60-4B02-AE87-00D78D8422AF}" type="datetimeFigureOut">
               <a:rPr lang="en-US" dirty="0"/>
-              <a:t>3/9/2015</a:t>
+              <a:t>3/10/2015</a:t>
             </a:fld>
             <a:endParaRPr lang="en-US" dirty="0"/>
           </a:p>
@@ -3141,7 +3140,7 @@
           <a:p>
             <a:fld id="{C9CAD897-D46E-4AD2-BD9B-49DD3E640873}" type="datetimeFigureOut">
               <a:rPr lang="en-US" dirty="0"/>
-              <a:t>3/9/2015</a:t>
+              <a:t>3/10/2015</a:t>
             </a:fld>
             <a:endParaRPr lang="en-US" dirty="0"/>
           </a:p>
@@ -3423,7 +3422,7 @@
           <a:p>
             <a:fld id="{98624D31-43A5-475A-80CF-332C9F6DCF35}" type="datetimeFigureOut">
               <a:rPr lang="en-US" dirty="0"/>
-              <a:t>3/9/2015</a:t>
+              <a:t>3/10/2015</a:t>
             </a:fld>
             <a:endParaRPr lang="en-US" dirty="0"/>
           </a:p>
@@ -3968,7 +3967,7 @@
             </a:br>
             <a:r>
               <a:rPr lang="en-US" sz="6600" dirty="0" smtClean="0"/>
-              <a:t>Software Requirements Specifications</a:t>
+              <a:t>Design Specifications</a:t>
             </a:r>
             <a:endParaRPr lang="en-US" sz="4800" dirty="0"/>
           </a:p>
@@ -4087,7 +4086,7 @@
       </p:grpSpPr>
       <p:sp>
         <p:nvSpPr>
-          <p:cNvPr id="2" name="Title 1"/>
+          <p:cNvPr id="4" name="Title 3"/>
           <p:cNvSpPr>
             <a:spLocks noGrp="1"/>
           </p:cNvSpPr>
@@ -4102,7 +4101,7 @@
           <a:p>
             <a:r>
               <a:rPr lang="en-US" dirty="0" smtClean="0"/>
-              <a:t>Technical Specifications</a:t>
+              <a:t>Technical Specifications continued</a:t>
             </a:r>
             <a:endParaRPr lang="en-US" dirty="0"/>
           </a:p>
@@ -4110,7 +4109,7 @@
       </p:sp>
       <p:sp>
         <p:nvSpPr>
-          <p:cNvPr id="3" name="Content Placeholder 2"/>
+          <p:cNvPr id="5" name="Content Placeholder 4"/>
           <p:cNvSpPr>
             <a:spLocks noGrp="1"/>
           </p:cNvSpPr>
@@ -4123,44 +4122,218 @@
           <a:bodyPr/>
           <a:lstStyle/>
           <a:p>
-            <a:pPr>
+            <a:pPr lvl="1">
               <a:buFont typeface="Courier New" panose="02070309020205020404" pitchFamily="49" charset="0"/>
               <a:buChar char="o"/>
             </a:pPr>
             <a:r>
               <a:rPr lang="en-US" dirty="0" smtClean="0"/>
-              <a:t>Game Engine</a:t>
-            </a:r>
-          </a:p>
-          <a:p>
-            <a:pPr>
+              <a:t>Artificial Intelligence</a:t>
+            </a:r>
+          </a:p>
+          <a:p>
+            <a:pPr lvl="2">
               <a:buFont typeface="Courier New" panose="02070309020205020404" pitchFamily="49" charset="0"/>
               <a:buChar char="o"/>
             </a:pPr>
             <a:r>
               <a:rPr lang="en-US" dirty="0" smtClean="0"/>
-              <a:t>Platform and OS</a:t>
+              <a:t>Vision Range</a:t>
+            </a:r>
+          </a:p>
+          <a:p>
+            <a:pPr lvl="2">
+              <a:buFont typeface="Courier New" panose="02070309020205020404" pitchFamily="49" charset="0"/>
+              <a:buChar char="o"/>
+            </a:pPr>
+            <a:r>
+              <a:rPr lang="en-US" dirty="0" smtClean="0"/>
+              <a:t>Return Range</a:t>
+            </a:r>
+          </a:p>
+          <a:p>
+            <a:pPr lvl="2">
+              <a:buFont typeface="Courier New" panose="02070309020205020404" pitchFamily="49" charset="0"/>
+              <a:buChar char="o"/>
+            </a:pPr>
+            <a:r>
+              <a:rPr lang="en-US" dirty="0" smtClean="0"/>
+              <a:t>Waypoints</a:t>
+            </a:r>
+          </a:p>
+          <a:p>
+            <a:pPr lvl="1">
+              <a:buFont typeface="Courier New" panose="02070309020205020404" pitchFamily="49" charset="0"/>
+              <a:buChar char="o"/>
+            </a:pPr>
+            <a:r>
+              <a:rPr lang="en-US" dirty="0" smtClean="0"/>
+              <a:t>Hardware Architecture</a:t>
+            </a:r>
+          </a:p>
+          <a:p>
+            <a:pPr lvl="2">
+              <a:buFont typeface="Courier New" panose="02070309020205020404" pitchFamily="49" charset="0"/>
+              <a:buChar char="o"/>
+            </a:pPr>
+            <a:r>
+              <a:rPr lang="en-US" dirty="0" smtClean="0"/>
+              <a:t>I/O devices </a:t>
+            </a:r>
+          </a:p>
+          <a:p>
+            <a:pPr lvl="2">
+              <a:buFont typeface="Courier New" panose="02070309020205020404" pitchFamily="49" charset="0"/>
+              <a:buChar char="o"/>
+            </a:pPr>
+            <a:r>
+              <a:rPr lang="en-US" dirty="0" smtClean="0"/>
+              <a:t>PC</a:t>
             </a:r>
             <a:endParaRPr lang="en-US" dirty="0"/>
           </a:p>
-          <a:p>
-            <a:pPr marL="0" indent="0">
-              <a:buNone/>
-            </a:pPr>
-            <a:endParaRPr lang="en-US" dirty="0"/>
-          </a:p>
-        </p:txBody>
-      </p:sp>
+        </p:txBody>
+      </p:sp>
+      <p:sp>
+        <p:nvSpPr>
+          <p:cNvPr id="6" name="Rectangle 2"/>
+          <p:cNvSpPr>
+            <a:spLocks noChangeArrowheads="1"/>
+          </p:cNvSpPr>
+          <p:nvPr/>
+        </p:nvSpPr>
+        <p:spPr bwMode="auto">
+          <a:xfrm>
+            <a:off x="4470399" y="1845733"/>
+            <a:ext cx="12874161" cy="45719"/>
+          </a:xfrm>
+          <a:prstGeom prst="rect">
+            <a:avLst/>
+          </a:prstGeom>
+          <a:noFill/>
+          <a:ln>
+            <a:noFill/>
+          </a:ln>
+          <a:effectLst/>
+          <a:extLst>
+            <a:ext uri="{909E8E84-426E-40DD-AFC4-6F175D3DCCD1}">
+              <a14:hiddenFill xmlns:a14="http://schemas.microsoft.com/office/drawing/2010/main">
+                <a:solidFill>
+                  <a:schemeClr val="accent1"/>
+                </a:solidFill>
+              </a14:hiddenFill>
+            </a:ext>
+            <a:ext uri="{91240B29-F687-4F45-9708-019B960494DF}">
+              <a14:hiddenLine xmlns:a14="http://schemas.microsoft.com/office/drawing/2010/main" w="9525">
+                <a:solidFill>
+                  <a:schemeClr val="tx1"/>
+                </a:solidFill>
+                <a:miter lim="800000"/>
+                <a:headEnd/>
+                <a:tailEnd/>
+              </a14:hiddenLine>
+            </a:ext>
+            <a:ext uri="{AF507438-7753-43E0-B8FC-AC1667EBCBE1}">
+              <a14:hiddenEffects xmlns:a14="http://schemas.microsoft.com/office/drawing/2010/main">
+                <a:effectLst>
+                  <a:outerShdw dist="35921" dir="2700000" algn="ctr" rotWithShape="0">
+                    <a:schemeClr val="bg2"/>
+                  </a:outerShdw>
+                </a:effectLst>
+              </a14:hiddenEffects>
+            </a:ext>
+          </a:extLst>
+        </p:spPr>
+        <p:txBody>
+          <a:bodyPr vert="horz" wrap="square" lIns="91440" tIns="45720" rIns="91440" bIns="45720" numCol="1" anchor="ctr" anchorCtr="0" compatLnSpc="1">
+            <a:prstTxWarp prst="textNoShape">
+              <a:avLst/>
+            </a:prstTxWarp>
+            <a:spAutoFit/>
+          </a:bodyPr>
+          <a:lstStyle/>
+          <a:p>
+            <a:endParaRPr lang="en-US"/>
+          </a:p>
+        </p:txBody>
+      </p:sp>
+      <p:graphicFrame>
+        <p:nvGraphicFramePr>
+          <p:cNvPr id="7" name="Object 6"/>
+          <p:cNvGraphicFramePr>
+            <a:graphicFrameLocks noChangeAspect="1"/>
+          </p:cNvGraphicFramePr>
+          <p:nvPr>
+            <p:extLst>
+              <p:ext uri="{D42A27DB-BD31-4B8C-83A1-F6EECF244321}">
+                <p14:modId xmlns:p14="http://schemas.microsoft.com/office/powerpoint/2010/main" val="1097016694"/>
+              </p:ext>
+            </p:extLst>
+          </p:nvPr>
+        </p:nvGraphicFramePr>
+        <p:xfrm>
+          <a:off x="4470400" y="1845734"/>
+          <a:ext cx="6807491" cy="3520350"/>
+        </p:xfrm>
+        <a:graphic>
+          <a:graphicData uri="http://schemas.openxmlformats.org/presentationml/2006/ole">
+            <mc:AlternateContent xmlns:mc="http://schemas.openxmlformats.org/markup-compatibility/2006">
+              <mc:Choice xmlns:v="urn:schemas-microsoft-com:vml" Requires="v">
+                <p:oleObj spid="_x0000_s4102" r:id="rId3" imgW="5848208" imgH="3009847" progId="Visio.Drawing.15">
+                  <p:embed/>
+                </p:oleObj>
+              </mc:Choice>
+              <mc:Fallback>
+                <p:oleObj r:id="rId3" imgW="5848208" imgH="3009847" progId="Visio.Drawing.15">
+                  <p:embed/>
+                  <p:pic>
+                    <p:nvPicPr>
+                      <p:cNvPr id="0" name="Object 1"/>
+                      <p:cNvPicPr>
+                        <a:picLocks noChangeAspect="1" noChangeArrowheads="1"/>
+                      </p:cNvPicPr>
+                      <p:nvPr/>
+                    </p:nvPicPr>
+                    <p:blipFill>
+                      <a:blip r:embed="rId4">
+                        <a:extLst>
+                          <a:ext uri="{28A0092B-C50C-407E-A947-70E740481C1C}">
+                            <a14:useLocalDpi xmlns:a14="http://schemas.microsoft.com/office/drawing/2010/main" val="0"/>
+                          </a:ext>
+                        </a:extLst>
+                      </a:blip>
+                      <a:srcRect/>
+                      <a:stretch>
+                        <a:fillRect/>
+                      </a:stretch>
+                    </p:blipFill>
+                    <p:spPr bwMode="auto">
+                      <a:xfrm>
+                        <a:off x="4470400" y="1845734"/>
+                        <a:ext cx="6807491" cy="3520350"/>
+                      </a:xfrm>
+                      <a:prstGeom prst="rect">
+                        <a:avLst/>
+                      </a:prstGeom>
+                      <a:noFill/>
+                    </p:spPr>
+                  </p:pic>
+                </p:oleObj>
+              </mc:Fallback>
+            </mc:AlternateContent>
+          </a:graphicData>
+        </a:graphic>
+      </p:graphicFrame>
       <p:pic>
         <p:nvPicPr>
-          <p:cNvPr id="4" name="Picture 3"/>
+          <p:cNvPr id="8" name="Picture 7"/>
           <p:cNvPicPr>
             <a:picLocks noChangeAspect="1"/>
           </p:cNvPicPr>
           <p:nvPr/>
         </p:nvPicPr>
         <p:blipFill>
-          <a:blip r:embed="rId2">
+          <a:blip r:embed="rId5">
             <a:extLst>
               <a:ext uri="{28A0092B-C50C-407E-A947-70E740481C1C}">
                 <a14:useLocalDpi xmlns:a14="http://schemas.microsoft.com/office/drawing/2010/main" val="0"/>
@@ -4172,9 +4345,9 @@
           </a:stretch>
         </p:blipFill>
         <p:spPr>
-          <a:xfrm flipH="1">
-            <a:off x="7446125" y="2205331"/>
-            <a:ext cx="3709555" cy="3911631"/>
+          <a:xfrm>
+            <a:off x="10421660" y="0"/>
+            <a:ext cx="885306" cy="1737360"/>
           </a:xfrm>
           <a:prstGeom prst="roundRect">
             <a:avLst>
@@ -4197,7 +4370,7 @@
     </p:spTree>
     <p:extLst>
       <p:ext uri="{BB962C8B-B14F-4D97-AF65-F5344CB8AC3E}">
-        <p14:creationId xmlns:p14="http://schemas.microsoft.com/office/powerpoint/2010/main" val="2886218978"/>
+        <p14:creationId xmlns:p14="http://schemas.microsoft.com/office/powerpoint/2010/main" val="3952817088"/>
       </p:ext>
     </p:extLst>
   </p:cSld>
@@ -4241,88 +4414,385 @@
             <p:ph type="title"/>
           </p:nvPr>
         </p:nvSpPr>
-        <p:spPr/>
-        <p:txBody>
-          <a:bodyPr/>
-          <a:lstStyle/>
-          <a:p>
-            <a:r>
-              <a:rPr lang="en-US" dirty="0" smtClean="0"/>
-              <a:t>Production Schedule</a:t>
-            </a:r>
-            <a:endParaRPr lang="en-US" dirty="0"/>
-          </a:p>
-        </p:txBody>
-      </p:sp>
-      <p:sp>
-        <p:nvSpPr>
-          <p:cNvPr id="3" name="Content Placeholder 2"/>
-          <p:cNvSpPr>
-            <a:spLocks noGrp="1"/>
-          </p:cNvSpPr>
-          <p:nvPr>
-            <p:ph idx="1"/>
-          </p:nvPr>
-        </p:nvSpPr>
-        <p:spPr/>
+        <p:spPr>
+          <a:xfrm>
+            <a:off x="457200" y="594359"/>
+            <a:ext cx="3200400" cy="679270"/>
+          </a:xfrm>
+        </p:spPr>
         <p:txBody>
           <a:bodyPr>
             <a:normAutofit/>
           </a:bodyPr>
           <a:lstStyle/>
           <a:p>
-            <a:pPr>
-              <a:buFont typeface="Courier New" panose="02070309020205020404" pitchFamily="49" charset="0"/>
-              <a:buChar char="o"/>
+            <a:r>
+              <a:rPr lang="en-US" sz="4400" dirty="0" smtClean="0"/>
+              <a:t>Use Cases</a:t>
+            </a:r>
+            <a:endParaRPr lang="en-US" sz="4400" dirty="0"/>
+          </a:p>
+        </p:txBody>
+      </p:sp>
+      <p:sp>
+        <p:nvSpPr>
+          <p:cNvPr id="6" name="Text Placeholder 5"/>
+          <p:cNvSpPr>
+            <a:spLocks noGrp="1"/>
+          </p:cNvSpPr>
+          <p:nvPr>
+            <p:ph type="body" sz="half" idx="2"/>
+          </p:nvPr>
+        </p:nvSpPr>
+        <p:spPr>
+          <a:xfrm>
+            <a:off x="457200" y="1273629"/>
+            <a:ext cx="3200400" cy="5031575"/>
+          </a:xfrm>
+        </p:spPr>
+        <p:txBody>
+          <a:bodyPr>
+            <a:normAutofit lnSpcReduction="10000"/>
+          </a:bodyPr>
+          <a:lstStyle/>
+          <a:p>
+            <a:pPr marL="285750" indent="-285750">
+              <a:buFont typeface="Wingdings" panose="05000000000000000000" pitchFamily="2" charset="2"/>
+              <a:buChar char="q"/>
             </a:pPr>
             <a:r>
-              <a:rPr lang="en-US" sz="2800" dirty="0" smtClean="0"/>
-              <a:t>Scope</a:t>
-            </a:r>
-          </a:p>
-          <a:p>
-            <a:pPr>
-              <a:buFont typeface="Courier New" panose="02070309020205020404" pitchFamily="49" charset="0"/>
-              <a:buChar char="o"/>
+              <a:rPr lang="en-US" sz="2400" dirty="0" smtClean="0"/>
+              <a:t>Actors</a:t>
+            </a:r>
+          </a:p>
+          <a:p>
+            <a:pPr marL="285750" indent="-285750">
+              <a:buFont typeface="Wingdings" panose="05000000000000000000" pitchFamily="2" charset="2"/>
+              <a:buChar char="q"/>
             </a:pPr>
             <a:r>
-              <a:rPr lang="en-US" sz="2800" dirty="0" smtClean="0"/>
-              <a:t>Scheduling</a:t>
-            </a:r>
-          </a:p>
-          <a:p>
-            <a:pPr>
-              <a:buFont typeface="Courier New" panose="02070309020205020404" pitchFamily="49" charset="0"/>
-              <a:buChar char="o"/>
+              <a:rPr lang="en-US" sz="2400" dirty="0" smtClean="0"/>
+              <a:t>Menu Use Cases</a:t>
+            </a:r>
+            <a:r>
+              <a:rPr lang="en-US" sz="2400" dirty="0" smtClean="0"/>
+              <a:t>	</a:t>
+            </a:r>
+          </a:p>
+          <a:p>
+            <a:pPr marL="742950" lvl="1" indent="-285750">
+              <a:buFont typeface="Wingdings" panose="05000000000000000000" pitchFamily="2" charset="2"/>
+              <a:buChar char="q"/>
             </a:pPr>
             <a:r>
-              <a:rPr lang="en-US" sz="2800" dirty="0" smtClean="0"/>
-              <a:t>Dependencies</a:t>
-            </a:r>
-          </a:p>
-          <a:p>
-            <a:pPr>
-              <a:buFont typeface="Courier New" panose="02070309020205020404" pitchFamily="49" charset="0"/>
-              <a:buChar char="o"/>
+              <a:rPr lang="en-US" sz="2100" dirty="0" smtClean="0">
+                <a:solidFill>
+                  <a:schemeClr val="bg1"/>
+                </a:solidFill>
+              </a:rPr>
+              <a:t>Begin new </a:t>
+            </a:r>
+            <a:r>
+              <a:rPr lang="en-US" sz="2100" dirty="0" smtClean="0">
+                <a:solidFill>
+                  <a:schemeClr val="bg1"/>
+                </a:solidFill>
+              </a:rPr>
+              <a:t>game</a:t>
+            </a:r>
+          </a:p>
+          <a:p>
+            <a:pPr marL="742950" lvl="1" indent="-285750">
+              <a:buFont typeface="Wingdings" panose="05000000000000000000" pitchFamily="2" charset="2"/>
+              <a:buChar char="q"/>
             </a:pPr>
             <a:r>
-              <a:rPr lang="en-US" sz="2800" dirty="0" smtClean="0"/>
-              <a:t>Cost Estimate</a:t>
-            </a:r>
-            <a:endParaRPr lang="en-US" sz="2800" dirty="0" smtClean="0"/>
-          </a:p>
-        </p:txBody>
-      </p:sp>
+              <a:rPr lang="en-US" sz="2100" dirty="0" smtClean="0">
+                <a:solidFill>
+                  <a:schemeClr val="bg1"/>
+                </a:solidFill>
+              </a:rPr>
+              <a:t>Options</a:t>
+            </a:r>
+          </a:p>
+          <a:p>
+            <a:pPr marL="742950" lvl="1" indent="-285750">
+              <a:buFont typeface="Wingdings" panose="05000000000000000000" pitchFamily="2" charset="2"/>
+              <a:buChar char="q"/>
+            </a:pPr>
+            <a:r>
+              <a:rPr lang="en-US" sz="2100" dirty="0" smtClean="0">
+                <a:solidFill>
+                  <a:schemeClr val="bg1"/>
+                </a:solidFill>
+              </a:rPr>
+              <a:t>Credits</a:t>
+            </a:r>
+          </a:p>
+          <a:p>
+            <a:pPr marL="742950" lvl="1" indent="-285750">
+              <a:buFont typeface="Wingdings" panose="05000000000000000000" pitchFamily="2" charset="2"/>
+              <a:buChar char="q"/>
+            </a:pPr>
+            <a:r>
+              <a:rPr lang="en-US" sz="2100" dirty="0" smtClean="0">
+                <a:solidFill>
+                  <a:schemeClr val="bg1"/>
+                </a:solidFill>
+              </a:rPr>
+              <a:t>Exit Game</a:t>
+            </a:r>
+          </a:p>
+          <a:p>
+            <a:pPr marL="742950" lvl="1" indent="-285750">
+              <a:buFont typeface="Wingdings" panose="05000000000000000000" pitchFamily="2" charset="2"/>
+              <a:buChar char="q"/>
+            </a:pPr>
+            <a:r>
+              <a:rPr lang="en-US" sz="2100" dirty="0" smtClean="0">
+                <a:solidFill>
+                  <a:schemeClr val="bg1"/>
+                </a:solidFill>
+              </a:rPr>
+              <a:t>10 Total</a:t>
+            </a:r>
+            <a:endParaRPr lang="en-US" sz="2100" dirty="0" smtClean="0">
+              <a:solidFill>
+                <a:schemeClr val="bg1"/>
+              </a:solidFill>
+            </a:endParaRPr>
+          </a:p>
+          <a:p>
+            <a:pPr marL="285750" indent="-285750">
+              <a:buFont typeface="Wingdings" panose="05000000000000000000" pitchFamily="2" charset="2"/>
+              <a:buChar char="q"/>
+            </a:pPr>
+            <a:r>
+              <a:rPr lang="en-US" sz="2400" dirty="0" smtClean="0">
+                <a:solidFill>
+                  <a:schemeClr val="bg1"/>
+                </a:solidFill>
+              </a:rPr>
+              <a:t>Character Use Cases</a:t>
+            </a:r>
+          </a:p>
+          <a:p>
+            <a:pPr marL="742950" lvl="1" indent="-285750">
+              <a:buFont typeface="Wingdings" panose="05000000000000000000" pitchFamily="2" charset="2"/>
+              <a:buChar char="q"/>
+            </a:pPr>
+            <a:r>
+              <a:rPr lang="en-US" sz="2100" dirty="0" smtClean="0">
+                <a:solidFill>
+                  <a:schemeClr val="bg1"/>
+                </a:solidFill>
+              </a:rPr>
+              <a:t>Move</a:t>
+            </a:r>
+          </a:p>
+          <a:p>
+            <a:pPr marL="742950" lvl="1" indent="-285750">
+              <a:buFont typeface="Wingdings" panose="05000000000000000000" pitchFamily="2" charset="2"/>
+              <a:buChar char="q"/>
+            </a:pPr>
+            <a:r>
+              <a:rPr lang="en-US" sz="2100" dirty="0" smtClean="0">
+                <a:solidFill>
+                  <a:schemeClr val="bg1"/>
+                </a:solidFill>
+              </a:rPr>
+              <a:t>Attack</a:t>
+            </a:r>
+          </a:p>
+          <a:p>
+            <a:pPr marL="742950" lvl="1" indent="-285750">
+              <a:buFont typeface="Wingdings" panose="05000000000000000000" pitchFamily="2" charset="2"/>
+              <a:buChar char="q"/>
+            </a:pPr>
+            <a:r>
+              <a:rPr lang="en-US" sz="2100" dirty="0" smtClean="0">
+                <a:solidFill>
+                  <a:schemeClr val="bg1"/>
+                </a:solidFill>
+              </a:rPr>
+              <a:t>Use Item</a:t>
+            </a:r>
+          </a:p>
+          <a:p>
+            <a:pPr marL="742950" lvl="1" indent="-285750">
+              <a:buFont typeface="Wingdings" panose="05000000000000000000" pitchFamily="2" charset="2"/>
+              <a:buChar char="q"/>
+            </a:pPr>
+            <a:r>
+              <a:rPr lang="en-US" sz="2100" dirty="0" smtClean="0">
+                <a:solidFill>
+                  <a:schemeClr val="bg1"/>
+                </a:solidFill>
+              </a:rPr>
+              <a:t>Interact</a:t>
+            </a:r>
+          </a:p>
+          <a:p>
+            <a:pPr marL="742950" lvl="1" indent="-285750">
+              <a:buFont typeface="Wingdings" panose="05000000000000000000" pitchFamily="2" charset="2"/>
+              <a:buChar char="q"/>
+            </a:pPr>
+            <a:r>
+              <a:rPr lang="en-US" sz="2100" dirty="0" smtClean="0">
+                <a:solidFill>
+                  <a:schemeClr val="bg1"/>
+                </a:solidFill>
+              </a:rPr>
+              <a:t>12 Total</a:t>
+            </a:r>
+            <a:endParaRPr lang="en-US" sz="2100" dirty="0" smtClean="0">
+              <a:solidFill>
+                <a:schemeClr val="bg1"/>
+              </a:solidFill>
+            </a:endParaRPr>
+          </a:p>
+        </p:txBody>
+      </p:sp>
+      <p:sp>
+        <p:nvSpPr>
+          <p:cNvPr id="3" name="Rectangle 2"/>
+          <p:cNvSpPr>
+            <a:spLocks noChangeArrowheads="1"/>
+          </p:cNvSpPr>
+          <p:nvPr/>
+        </p:nvSpPr>
+        <p:spPr bwMode="auto">
+          <a:xfrm>
+            <a:off x="4225860" y="779275"/>
+            <a:ext cx="13235857" cy="45719"/>
+          </a:xfrm>
+          <a:prstGeom prst="rect">
+            <a:avLst/>
+          </a:prstGeom>
+          <a:noFill/>
+          <a:ln>
+            <a:noFill/>
+          </a:ln>
+          <a:effectLst/>
+          <a:extLst>
+            <a:ext uri="{909E8E84-426E-40DD-AFC4-6F175D3DCCD1}">
+              <a14:hiddenFill xmlns:a14="http://schemas.microsoft.com/office/drawing/2010/main">
+                <a:solidFill>
+                  <a:schemeClr val="accent1"/>
+                </a:solidFill>
+              </a14:hiddenFill>
+            </a:ext>
+            <a:ext uri="{91240B29-F687-4F45-9708-019B960494DF}">
+              <a14:hiddenLine xmlns:a14="http://schemas.microsoft.com/office/drawing/2010/main" w="9525">
+                <a:solidFill>
+                  <a:schemeClr val="tx1"/>
+                </a:solidFill>
+                <a:miter lim="800000"/>
+                <a:headEnd/>
+                <a:tailEnd/>
+              </a14:hiddenLine>
+            </a:ext>
+            <a:ext uri="{AF507438-7753-43E0-B8FC-AC1667EBCBE1}">
+              <a14:hiddenEffects xmlns:a14="http://schemas.microsoft.com/office/drawing/2010/main">
+                <a:effectLst>
+                  <a:outerShdw dist="35921" dir="2700000" algn="ctr" rotWithShape="0">
+                    <a:schemeClr val="bg2"/>
+                  </a:outerShdw>
+                </a:effectLst>
+              </a14:hiddenEffects>
+            </a:ext>
+          </a:extLst>
+        </p:spPr>
+        <p:txBody>
+          <a:bodyPr vert="horz" wrap="square" lIns="91440" tIns="45720" rIns="91440" bIns="45720" numCol="1" anchor="ctr" anchorCtr="0" compatLnSpc="1">
+            <a:prstTxWarp prst="textNoShape">
+              <a:avLst/>
+            </a:prstTxWarp>
+            <a:spAutoFit/>
+          </a:bodyPr>
+          <a:lstStyle/>
+          <a:p>
+            <a:endParaRPr lang="en-US"/>
+          </a:p>
+        </p:txBody>
+      </p:sp>
+      <p:graphicFrame>
+        <p:nvGraphicFramePr>
+          <p:cNvPr id="5" name="Object 4"/>
+          <p:cNvGraphicFramePr>
+            <a:graphicFrameLocks noChangeAspect="1"/>
+          </p:cNvGraphicFramePr>
+          <p:nvPr>
+            <p:extLst>
+              <p:ext uri="{D42A27DB-BD31-4B8C-83A1-F6EECF244321}">
+                <p14:modId xmlns:p14="http://schemas.microsoft.com/office/powerpoint/2010/main" val="4279879873"/>
+              </p:ext>
+            </p:extLst>
+          </p:nvPr>
+        </p:nvGraphicFramePr>
+        <p:xfrm>
+          <a:off x="4225861" y="779276"/>
+          <a:ext cx="7687871" cy="5084114"/>
+        </p:xfrm>
+        <a:graphic>
+          <a:graphicData uri="http://schemas.openxmlformats.org/presentationml/2006/ole">
+            <mc:AlternateContent xmlns:mc="http://schemas.openxmlformats.org/markup-compatibility/2006">
+              <mc:Choice xmlns:v="urn:schemas-microsoft-com:vml" Requires="v">
+                <p:oleObj spid="_x0000_s5126" r:id="rId3" imgW="6667590" imgH="4419508" progId="Visio.Drawing.15">
+                  <p:embed/>
+                </p:oleObj>
+              </mc:Choice>
+              <mc:Fallback>
+                <p:oleObj r:id="rId3" imgW="6667590" imgH="4419508" progId="Visio.Drawing.15">
+                  <p:embed/>
+                  <p:pic>
+                    <p:nvPicPr>
+                      <p:cNvPr id="0" name="Object 1"/>
+                      <p:cNvPicPr>
+                        <a:picLocks noChangeAspect="1" noChangeArrowheads="1"/>
+                      </p:cNvPicPr>
+                      <p:nvPr/>
+                    </p:nvPicPr>
+                    <p:blipFill>
+                      <a:blip r:embed="rId4">
+                        <a:extLst>
+                          <a:ext uri="{28A0092B-C50C-407E-A947-70E740481C1C}">
+                            <a14:useLocalDpi xmlns:a14="http://schemas.microsoft.com/office/drawing/2010/main" val="0"/>
+                          </a:ext>
+                        </a:extLst>
+                      </a:blip>
+                      <a:srcRect/>
+                      <a:stretch>
+                        <a:fillRect/>
+                      </a:stretch>
+                    </p:blipFill>
+                    <p:spPr bwMode="auto">
+                      <a:xfrm>
+                        <a:off x="4225861" y="779276"/>
+                        <a:ext cx="7687871" cy="5084114"/>
+                      </a:xfrm>
+                      <a:prstGeom prst="rect">
+                        <a:avLst/>
+                      </a:prstGeom>
+                      <a:noFill/>
+                    </p:spPr>
+                  </p:pic>
+                </p:oleObj>
+              </mc:Fallback>
+            </mc:AlternateContent>
+          </a:graphicData>
+        </a:graphic>
+      </p:graphicFrame>
       <p:pic>
         <p:nvPicPr>
-          <p:cNvPr id="5" name="Picture 4"/>
+          <p:cNvPr id="7" name="Picture 6"/>
           <p:cNvPicPr>
             <a:picLocks noChangeAspect="1"/>
           </p:cNvPicPr>
           <p:nvPr/>
         </p:nvPicPr>
         <p:blipFill>
-          <a:blip r:embed="rId2">
+          <a:blip r:embed="rId5">
             <a:extLst>
               <a:ext uri="{28A0092B-C50C-407E-A947-70E740481C1C}">
                 <a14:useLocalDpi xmlns:a14="http://schemas.microsoft.com/office/drawing/2010/main" val="0"/>
@@ -4335,185 +4805,8 @@
         </p:blipFill>
         <p:spPr>
           <a:xfrm>
-            <a:off x="7873619" y="2103457"/>
-            <a:ext cx="1962424" cy="3229426"/>
-          </a:xfrm>
-          <a:prstGeom prst="rect">
-            <a:avLst/>
-          </a:prstGeom>
-        </p:spPr>
-      </p:pic>
-    </p:spTree>
-    <p:extLst>
-      <p:ext uri="{BB962C8B-B14F-4D97-AF65-F5344CB8AC3E}">
-        <p14:creationId xmlns:p14="http://schemas.microsoft.com/office/powerpoint/2010/main" val="2765650733"/>
-      </p:ext>
-    </p:extLst>
-  </p:cSld>
-  <p:clrMapOvr>
-    <a:masterClrMapping/>
-  </p:clrMapOvr>
-  <p:timing>
-    <p:tnLst>
-      <p:par>
-        <p:cTn id="1" dur="indefinite" restart="never" nodeType="tmRoot"/>
-      </p:par>
-    </p:tnLst>
-  </p:timing>
-</p:sld>
-</file>
-
-<file path=ppt/slides/slide12.xml><?xml version="1.0" encoding="utf-8"?>
-<p:sld xmlns:a="http://schemas.openxmlformats.org/drawingml/2006/main" xmlns:r="http://schemas.openxmlformats.org/officeDocument/2006/relationships" xmlns:p="http://schemas.openxmlformats.org/presentationml/2006/main">
-  <p:cSld>
-    <p:spTree>
-      <p:nvGrpSpPr>
-        <p:cNvPr id="1" name=""/>
-        <p:cNvGrpSpPr/>
-        <p:nvPr/>
-      </p:nvGrpSpPr>
-      <p:grpSpPr>
-        <a:xfrm>
-          <a:off x="0" y="0"/>
-          <a:ext cx="0" cy="0"/>
-          <a:chOff x="0" y="0"/>
-          <a:chExt cx="0" cy="0"/>
-        </a:xfrm>
-      </p:grpSpPr>
-      <p:sp>
-        <p:nvSpPr>
-          <p:cNvPr id="2" name="Title 1"/>
-          <p:cNvSpPr>
-            <a:spLocks noGrp="1"/>
-          </p:cNvSpPr>
-          <p:nvPr>
-            <p:ph type="title"/>
-          </p:nvPr>
-        </p:nvSpPr>
-        <p:spPr>
-          <a:xfrm>
-            <a:off x="457200" y="594359"/>
-            <a:ext cx="3200400" cy="679270"/>
-          </a:xfrm>
-        </p:spPr>
-        <p:txBody>
-          <a:bodyPr>
-            <a:normAutofit/>
-          </a:bodyPr>
-          <a:lstStyle/>
-          <a:p>
-            <a:r>
-              <a:rPr lang="en-US" sz="4400" dirty="0" smtClean="0"/>
-              <a:t>Use Cases</a:t>
-            </a:r>
-            <a:endParaRPr lang="en-US" sz="4400" dirty="0"/>
-          </a:p>
-        </p:txBody>
-      </p:sp>
-      <p:sp>
-        <p:nvSpPr>
-          <p:cNvPr id="6" name="Text Placeholder 5"/>
-          <p:cNvSpPr>
-            <a:spLocks noGrp="1"/>
-          </p:cNvSpPr>
-          <p:nvPr>
-            <p:ph type="body" sz="half" idx="2"/>
-          </p:nvPr>
-        </p:nvSpPr>
-        <p:spPr>
-          <a:xfrm>
-            <a:off x="457200" y="1273629"/>
-            <a:ext cx="3200400" cy="5031575"/>
-          </a:xfrm>
-        </p:spPr>
-        <p:txBody>
-          <a:bodyPr>
-            <a:normAutofit/>
-          </a:bodyPr>
-          <a:lstStyle/>
-          <a:p>
-            <a:pPr marL="285750" indent="-285750">
-              <a:buFont typeface="Wingdings" panose="05000000000000000000" pitchFamily="2" charset="2"/>
-              <a:buChar char="q"/>
-            </a:pPr>
-            <a:r>
-              <a:rPr lang="en-US" sz="2400" dirty="0" smtClean="0"/>
-              <a:t>Actors</a:t>
-            </a:r>
-            <a:endParaRPr lang="en-US" sz="2400" dirty="0" smtClean="0"/>
-          </a:p>
-          <a:p>
-            <a:pPr marL="285750" indent="-285750">
-              <a:buFont typeface="Wingdings" panose="05000000000000000000" pitchFamily="2" charset="2"/>
-              <a:buChar char="q"/>
-            </a:pPr>
-            <a:r>
-              <a:rPr lang="en-US" sz="2400" dirty="0" smtClean="0"/>
-              <a:t>List of Use C</a:t>
-            </a:r>
-            <a:r>
-              <a:rPr lang="en-US" sz="2400" dirty="0" smtClean="0">
-                <a:solidFill>
-                  <a:schemeClr val="bg1"/>
-                </a:solidFill>
-              </a:rPr>
-              <a:t>ase</a:t>
-            </a:r>
-            <a:r>
-              <a:rPr lang="en-US" sz="2400" dirty="0" smtClean="0"/>
-              <a:t>s</a:t>
-            </a:r>
-            <a:r>
-              <a:rPr lang="en-US" sz="2400" dirty="0" smtClean="0"/>
-              <a:t>	</a:t>
-            </a:r>
-            <a:endParaRPr lang="en-US" sz="2400" dirty="0" smtClean="0"/>
-          </a:p>
-          <a:p>
-            <a:pPr marL="742950" lvl="1" indent="-285750">
-              <a:buFont typeface="Wingdings" panose="05000000000000000000" pitchFamily="2" charset="2"/>
-              <a:buChar char="q"/>
-            </a:pPr>
-            <a:r>
-              <a:rPr lang="en-US" sz="2100" dirty="0" smtClean="0">
-                <a:solidFill>
-                  <a:schemeClr val="bg1"/>
-                </a:solidFill>
-              </a:rPr>
-              <a:t>Begin new game</a:t>
-            </a:r>
-            <a:endParaRPr lang="en-US" sz="2100" dirty="0" smtClean="0">
-              <a:solidFill>
-                <a:schemeClr val="bg1"/>
-              </a:solidFill>
-            </a:endParaRPr>
-          </a:p>
-        </p:txBody>
-      </p:sp>
-      <p:pic>
-        <p:nvPicPr>
-          <p:cNvPr id="4" name="Picture 3"/>
-          <p:cNvPicPr>
-            <a:picLocks noChangeAspect="1"/>
-          </p:cNvPicPr>
-          <p:nvPr/>
-        </p:nvPicPr>
-        <p:blipFill>
-          <a:blip r:embed="rId2">
-            <a:extLst>
-              <a:ext uri="{28A0092B-C50C-407E-A947-70E740481C1C}">
-                <a14:useLocalDpi xmlns:a14="http://schemas.microsoft.com/office/drawing/2010/main" val="0"/>
-              </a:ext>
-            </a:extLst>
-          </a:blip>
-          <a:stretch>
-            <a:fillRect/>
-          </a:stretch>
-        </p:blipFill>
-        <p:spPr>
-          <a:xfrm>
-            <a:off x="4405745" y="1097972"/>
-            <a:ext cx="7455549" cy="4492335"/>
+            <a:off x="4415386" y="482656"/>
+            <a:ext cx="605791" cy="856875"/>
           </a:xfrm>
           <a:prstGeom prst="rect">
             <a:avLst/>
@@ -4574,7 +4867,7 @@
           <a:p>
             <a:r>
               <a:rPr lang="en-US" dirty="0" smtClean="0"/>
-              <a:t>Problem Description &amp; Scope</a:t>
+              <a:t>Game Description</a:t>
             </a:r>
             <a:endParaRPr lang="en-US" dirty="0"/>
           </a:p>
@@ -4590,7 +4883,12 @@
             <p:ph idx="1"/>
           </p:nvPr>
         </p:nvSpPr>
-        <p:spPr/>
+        <p:spPr>
+          <a:xfrm>
+            <a:off x="1097280" y="1845734"/>
+            <a:ext cx="4347556" cy="4023360"/>
+          </a:xfrm>
+        </p:spPr>
         <p:txBody>
           <a:bodyPr>
             <a:normAutofit/>
@@ -4603,7 +4901,7 @@
             </a:pPr>
             <a:r>
               <a:rPr lang="en-US" dirty="0" smtClean="0"/>
-              <a:t>A team of students from the College of Creative Studies have built up a collection of artwork including 3D models, textures, video, and sounds.  However, they lack the training and experience needed to implement and combine all of these assets in code.</a:t>
+              <a:t>Interactive, Immersive, Entertaining</a:t>
             </a:r>
           </a:p>
           <a:p>
@@ -4613,7 +4911,7 @@
             </a:pPr>
             <a:r>
               <a:rPr lang="en-US" dirty="0" smtClean="0"/>
-              <a:t>Demo</a:t>
+              <a:t>Imaginative, original environments</a:t>
             </a:r>
           </a:p>
           <a:p>
@@ -4623,56 +4921,108 @@
             </a:pPr>
             <a:r>
               <a:rPr lang="en-US" dirty="0" smtClean="0"/>
-              <a:t>1 Island</a:t>
-            </a:r>
-          </a:p>
-          <a:p>
-            <a:pPr>
+              <a:t>Target audience is expecting:</a:t>
+            </a:r>
+          </a:p>
+          <a:p>
+            <a:pPr lvl="1">
               <a:buFont typeface="Courier New" panose="02070309020205020404" pitchFamily="49" charset="0"/>
               <a:buChar char="o"/>
             </a:pPr>
             <a:r>
               <a:rPr lang="en-US" dirty="0" smtClean="0"/>
-              <a:t>User-Controlled camera</a:t>
-            </a:r>
-          </a:p>
-          <a:p>
-            <a:pPr>
+              <a:t>Freedom to explore</a:t>
+            </a:r>
+          </a:p>
+          <a:p>
+            <a:pPr lvl="1">
               <a:buFont typeface="Courier New" panose="02070309020205020404" pitchFamily="49" charset="0"/>
               <a:buChar char="o"/>
             </a:pPr>
             <a:r>
               <a:rPr lang="en-US" dirty="0" smtClean="0"/>
-              <a:t>Appropriate animations &amp; sounds</a:t>
-            </a:r>
-          </a:p>
-          <a:p>
-            <a:pPr>
-              <a:buFont typeface="Courier New" panose="02070309020205020404" pitchFamily="49" charset="0"/>
-              <a:buChar char="o"/>
-            </a:pPr>
-            <a:r>
-              <a:rPr lang="en-US" dirty="0" smtClean="0"/>
-              <a:t>Combat system</a:t>
-            </a:r>
-          </a:p>
-          <a:p>
-            <a:pPr>
-              <a:buFont typeface="Courier New" panose="02070309020205020404" pitchFamily="49" charset="0"/>
-              <a:buChar char="o"/>
-            </a:pPr>
-            <a:r>
-              <a:rPr lang="en-US" dirty="0" smtClean="0"/>
-              <a:t>Functional UI</a:t>
-            </a:r>
-            <a:endParaRPr lang="en-US" dirty="0"/>
-          </a:p>
-        </p:txBody>
-      </p:sp>
+              <a:t>Strong Storyline</a:t>
+            </a:r>
+          </a:p>
+        </p:txBody>
+      </p:sp>
+      <p:pic>
+        <p:nvPicPr>
+          <p:cNvPr id="8" name="Picture 7"/>
+          <p:cNvPicPr>
+            <a:picLocks noChangeAspect="1"/>
+          </p:cNvPicPr>
+          <p:nvPr/>
+        </p:nvPicPr>
+        <p:blipFill>
+          <a:blip r:embed="rId2">
+            <a:extLst>
+              <a:ext uri="{28A0092B-C50C-407E-A947-70E740481C1C}">
+                <a14:useLocalDpi xmlns:a14="http://schemas.microsoft.com/office/drawing/2010/main" val="0"/>
+              </a:ext>
+            </a:extLst>
+          </a:blip>
+          <a:stretch>
+            <a:fillRect/>
+          </a:stretch>
+        </p:blipFill>
+        <p:spPr>
+          <a:xfrm>
+            <a:off x="4862945" y="2338781"/>
+            <a:ext cx="6468774" cy="3436795"/>
+          </a:xfrm>
+          <a:prstGeom prst="rect">
+            <a:avLst/>
+          </a:prstGeom>
+        </p:spPr>
+      </p:pic>
+      <p:pic>
+        <p:nvPicPr>
+          <p:cNvPr id="4" name="Picture 3"/>
+          <p:cNvPicPr>
+            <a:picLocks noChangeAspect="1"/>
+          </p:cNvPicPr>
+          <p:nvPr/>
+        </p:nvPicPr>
+        <p:blipFill>
+          <a:blip r:embed="rId3">
+            <a:extLst>
+              <a:ext uri="{28A0092B-C50C-407E-A947-70E740481C1C}">
+                <a14:useLocalDpi xmlns:a14="http://schemas.microsoft.com/office/drawing/2010/main" val="0"/>
+              </a:ext>
+            </a:extLst>
+          </a:blip>
+          <a:stretch>
+            <a:fillRect/>
+          </a:stretch>
+        </p:blipFill>
+        <p:spPr>
+          <a:xfrm>
+            <a:off x="9461167" y="58177"/>
+            <a:ext cx="1214648" cy="1679183"/>
+          </a:xfrm>
+          <a:prstGeom prst="roundRect">
+            <a:avLst>
+              <a:gd name="adj" fmla="val 8594"/>
+            </a:avLst>
+          </a:prstGeom>
+          <a:solidFill>
+            <a:srgbClr val="FFFFFF">
+              <a:shade val="85000"/>
+            </a:srgbClr>
+          </a:solidFill>
+          <a:ln>
+            <a:noFill/>
+          </a:ln>
+          <a:effectLst>
+            <a:reflection blurRad="12700" stA="38000" endPos="28000" dist="5000" dir="5400000" sy="-100000" algn="bl" rotWithShape="0"/>
+          </a:effectLst>
+        </p:spPr>
+      </p:pic>
     </p:spTree>
     <p:extLst>
       <p:ext uri="{BB962C8B-B14F-4D97-AF65-F5344CB8AC3E}">
-        <p14:creationId xmlns:p14="http://schemas.microsoft.com/office/powerpoint/2010/main" val="2418298293"/>
+        <p14:creationId xmlns:p14="http://schemas.microsoft.com/office/powerpoint/2010/main" val="642959475"/>
       </p:ext>
     </p:extLst>
   </p:cSld>
@@ -4723,7 +5073,7 @@
           <a:p>
             <a:r>
               <a:rPr lang="en-US" dirty="0" smtClean="0"/>
-              <a:t>Game Description</a:t>
+              <a:t>Functional Specifications</a:t>
             </a:r>
             <a:endParaRPr lang="en-US" dirty="0"/>
           </a:p>
@@ -4739,12 +5089,7 @@
             <p:ph idx="1"/>
           </p:nvPr>
         </p:nvSpPr>
-        <p:spPr>
-          <a:xfrm>
-            <a:off x="1097280" y="1845734"/>
-            <a:ext cx="4347556" cy="4023360"/>
-          </a:xfrm>
-        </p:spPr>
+        <p:spPr/>
         <p:txBody>
           <a:bodyPr>
             <a:normAutofit/>
@@ -4756,8 +5101,8 @@
               <a:buChar char="o"/>
             </a:pPr>
             <a:r>
-              <a:rPr lang="en-US" dirty="0" smtClean="0"/>
-              <a:t>WORDS</a:t>
+              <a:rPr lang="en-US" sz="2800" dirty="0" smtClean="0"/>
+              <a:t>Rewards curious and adventurous players</a:t>
             </a:r>
           </a:p>
           <a:p>
@@ -4766,8 +5111,28 @@
               <a:buChar char="o"/>
             </a:pPr>
             <a:r>
-              <a:rPr lang="en-US" dirty="0" smtClean="0"/>
-              <a:t>SECOND LINE</a:t>
+              <a:rPr lang="en-US" sz="2800" dirty="0" smtClean="0"/>
+              <a:t>Victory conditions</a:t>
+            </a:r>
+          </a:p>
+          <a:p>
+            <a:pPr lvl="1">
+              <a:buFont typeface="Courier New" panose="02070309020205020404" pitchFamily="49" charset="0"/>
+              <a:buChar char="o"/>
+            </a:pPr>
+            <a:r>
+              <a:rPr lang="en-US" sz="2600" dirty="0" smtClean="0"/>
+              <a:t>Winning</a:t>
+            </a:r>
+          </a:p>
+          <a:p>
+            <a:pPr lvl="1">
+              <a:buFont typeface="Courier New" panose="02070309020205020404" pitchFamily="49" charset="0"/>
+              <a:buChar char="o"/>
+            </a:pPr>
+            <a:r>
+              <a:rPr lang="en-US" sz="2600" dirty="0" smtClean="0"/>
+              <a:t>Losing</a:t>
             </a:r>
           </a:p>
           <a:p>
@@ -4776,16 +5141,68 @@
               <a:buChar char="o"/>
             </a:pPr>
             <a:r>
-              <a:rPr lang="en-US" dirty="0" smtClean="0"/>
-              <a:t>THIRD LINE</a:t>
-            </a:r>
-            <a:endParaRPr lang="en-US" dirty="0"/>
+              <a:rPr lang="en-US" sz="2800" dirty="0" smtClean="0"/>
+              <a:t>Game Elements</a:t>
+            </a:r>
+          </a:p>
+          <a:p>
+            <a:pPr lvl="1">
+              <a:buFont typeface="Courier New" panose="02070309020205020404" pitchFamily="49" charset="0"/>
+              <a:buChar char="o"/>
+            </a:pPr>
+            <a:r>
+              <a:rPr lang="en-US" sz="2600" dirty="0" smtClean="0">
+                <a:sym typeface="Wingdings" panose="05000000000000000000" pitchFamily="2" charset="2"/>
+              </a:rPr>
+              <a:t>Health/Stamina</a:t>
+            </a:r>
+          </a:p>
+          <a:p>
+            <a:pPr lvl="1">
+              <a:buFont typeface="Courier New" panose="02070309020205020404" pitchFamily="49" charset="0"/>
+              <a:buChar char="o"/>
+            </a:pPr>
+            <a:r>
+              <a:rPr lang="en-US" sz="2600" dirty="0" smtClean="0">
+                <a:sym typeface="Wingdings" panose="05000000000000000000" pitchFamily="2" charset="2"/>
+              </a:rPr>
+              <a:t>Obstacles</a:t>
+            </a:r>
+          </a:p>
+          <a:p>
+            <a:pPr lvl="1">
+              <a:buFont typeface="Courier New" panose="02070309020205020404" pitchFamily="49" charset="0"/>
+              <a:buChar char="o"/>
+            </a:pPr>
+            <a:r>
+              <a:rPr lang="en-US" sz="2600" dirty="0" smtClean="0">
+                <a:sym typeface="Wingdings" panose="05000000000000000000" pitchFamily="2" charset="2"/>
+              </a:rPr>
+              <a:t>Items</a:t>
+            </a:r>
+            <a:endParaRPr lang="en-US" sz="2600" dirty="0" smtClean="0">
+              <a:sym typeface="Wingdings" panose="05000000000000000000" pitchFamily="2" charset="2"/>
+            </a:endParaRPr>
+          </a:p>
+          <a:p>
+            <a:pPr>
+              <a:buFont typeface="Courier New" panose="02070309020205020404" pitchFamily="49" charset="0"/>
+              <a:buChar char="o"/>
+            </a:pPr>
+            <a:endParaRPr lang="en-US" sz="2800" dirty="0" smtClean="0"/>
+          </a:p>
+          <a:p>
+            <a:pPr>
+              <a:buFont typeface="Courier New" panose="02070309020205020404" pitchFamily="49" charset="0"/>
+              <a:buChar char="o"/>
+            </a:pPr>
+            <a:endParaRPr lang="en-US" sz="2800" dirty="0" smtClean="0"/>
           </a:p>
         </p:txBody>
       </p:sp>
       <p:pic>
         <p:nvPicPr>
-          <p:cNvPr id="8" name="Picture 7"/>
+          <p:cNvPr id="4" name="Picture 3"/>
           <p:cNvPicPr>
             <a:picLocks noChangeAspect="1"/>
           </p:cNvPicPr>
@@ -4805,18 +5222,61 @@
         </p:blipFill>
         <p:spPr>
           <a:xfrm>
-            <a:off x="4862945" y="2338781"/>
-            <a:ext cx="6468774" cy="3436795"/>
+            <a:off x="6686117" y="2204826"/>
+            <a:ext cx="4181475" cy="3305175"/>
           </a:xfrm>
           <a:prstGeom prst="rect">
             <a:avLst/>
           </a:prstGeom>
+        </p:spPr>
+      </p:pic>
+      <p:pic>
+        <p:nvPicPr>
+          <p:cNvPr id="6" name="Picture 5"/>
+          <p:cNvPicPr>
+            <a:picLocks noChangeAspect="1"/>
+          </p:cNvPicPr>
+          <p:nvPr/>
+        </p:nvPicPr>
+        <p:blipFill>
+          <a:blip r:embed="rId3">
+            <a:extLst>
+              <a:ext uri="{28A0092B-C50C-407E-A947-70E740481C1C}">
+                <a14:useLocalDpi xmlns:a14="http://schemas.microsoft.com/office/drawing/2010/main" val="0"/>
+              </a:ext>
+            </a:extLst>
+          </a:blip>
+          <a:stretch>
+            <a:fillRect/>
+          </a:stretch>
+        </p:blipFill>
+        <p:spPr>
+          <a:xfrm>
+            <a:off x="9742682" y="228480"/>
+            <a:ext cx="948765" cy="1508880"/>
+          </a:xfrm>
+          <a:prstGeom prst="roundRect">
+            <a:avLst>
+              <a:gd name="adj" fmla="val 8594"/>
+            </a:avLst>
+          </a:prstGeom>
+          <a:solidFill>
+            <a:srgbClr val="FFFFFF">
+              <a:shade val="85000"/>
+            </a:srgbClr>
+          </a:solidFill>
+          <a:ln>
+            <a:noFill/>
+          </a:ln>
+          <a:effectLst>
+            <a:reflection blurRad="12700" stA="38000" endPos="28000" dist="5000" dir="5400000" sy="-100000" algn="bl" rotWithShape="0"/>
+          </a:effectLst>
         </p:spPr>
       </p:pic>
     </p:spTree>
     <p:extLst>
       <p:ext uri="{BB962C8B-B14F-4D97-AF65-F5344CB8AC3E}">
-        <p14:creationId xmlns:p14="http://schemas.microsoft.com/office/powerpoint/2010/main" val="642959475"/>
+        <p14:creationId xmlns:p14="http://schemas.microsoft.com/office/powerpoint/2010/main" val="204447137"/>
       </p:ext>
     </p:extLst>
   </p:cSld>
@@ -4867,7 +5327,7 @@
           <a:p>
             <a:r>
               <a:rPr lang="en-US" dirty="0" smtClean="0"/>
-              <a:t>Functional Specifications</a:t>
+              <a:t>User Interface and Menus</a:t>
             </a:r>
             <a:endParaRPr lang="en-US" dirty="0"/>
           </a:p>
@@ -4895,23 +5355,138 @@
               <a:buChar char="o"/>
             </a:pPr>
             <a:r>
-              <a:rPr lang="en-US" sz="2800" dirty="0" smtClean="0"/>
-              <a:t>Game mechanics</a:t>
-            </a:r>
-            <a:endParaRPr lang="en-US" sz="2800" dirty="0"/>
+              <a:rPr lang="en-US" dirty="0" smtClean="0"/>
+              <a:t>Splash Screen</a:t>
+            </a:r>
+          </a:p>
+          <a:p>
+            <a:pPr>
+              <a:buFont typeface="Courier New" panose="02070309020205020404" pitchFamily="49" charset="0"/>
+              <a:buChar char="o"/>
+            </a:pPr>
+            <a:r>
+              <a:rPr lang="en-US" dirty="0" smtClean="0"/>
+              <a:t>Menus</a:t>
+            </a:r>
+          </a:p>
+          <a:p>
+            <a:pPr>
+              <a:buFont typeface="Courier New" panose="02070309020205020404" pitchFamily="49" charset="0"/>
+              <a:buChar char="o"/>
+            </a:pPr>
+            <a:r>
+              <a:rPr lang="en-US" dirty="0" smtClean="0"/>
+              <a:t>HUD</a:t>
+            </a:r>
+          </a:p>
+          <a:p>
+            <a:pPr>
+              <a:buFont typeface="Courier New" panose="02070309020205020404" pitchFamily="49" charset="0"/>
+              <a:buChar char="o"/>
+            </a:pPr>
+            <a:r>
+              <a:rPr lang="en-US" dirty="0" smtClean="0"/>
+              <a:t>Brightness</a:t>
+            </a:r>
+          </a:p>
+          <a:p>
+            <a:pPr lvl="1">
+              <a:buFont typeface="Courier New" panose="02070309020205020404" pitchFamily="49" charset="0"/>
+              <a:buChar char="o"/>
+            </a:pPr>
+            <a:r>
+              <a:rPr lang="en-US" dirty="0" smtClean="0"/>
+              <a:t>70% - 130%</a:t>
+            </a:r>
+            <a:endParaRPr lang="en-US" dirty="0"/>
+          </a:p>
+          <a:p>
+            <a:pPr>
+              <a:buFont typeface="Courier New" panose="02070309020205020404" pitchFamily="49" charset="0"/>
+              <a:buChar char="o"/>
+            </a:pPr>
+            <a:r>
+              <a:rPr lang="en-US" dirty="0" smtClean="0"/>
+              <a:t>Resolution</a:t>
+            </a:r>
+          </a:p>
+          <a:p>
+            <a:pPr lvl="1">
+              <a:buFont typeface="Courier New" panose="02070309020205020404" pitchFamily="49" charset="0"/>
+              <a:buChar char="o"/>
+            </a:pPr>
+            <a:r>
+              <a:rPr lang="en-US" dirty="0" smtClean="0"/>
+              <a:t>16:9 Support</a:t>
+            </a:r>
+          </a:p>
+          <a:p>
+            <a:pPr>
+              <a:buFont typeface="Courier New" panose="02070309020205020404" pitchFamily="49" charset="0"/>
+              <a:buChar char="o"/>
+            </a:pPr>
+            <a:r>
+              <a:rPr lang="en-US" dirty="0" smtClean="0"/>
+              <a:t>Graphics</a:t>
+            </a:r>
+          </a:p>
+          <a:p>
+            <a:pPr lvl="1">
+              <a:buFont typeface="Courier New" panose="02070309020205020404" pitchFamily="49" charset="0"/>
+              <a:buChar char="o"/>
+            </a:pPr>
+            <a:r>
+              <a:rPr lang="en-US" dirty="0" smtClean="0"/>
+              <a:t>Low-High</a:t>
+            </a:r>
           </a:p>
         </p:txBody>
       </p:sp>
       <p:pic>
         <p:nvPicPr>
-          <p:cNvPr id="4" name="Picture 3"/>
+          <p:cNvPr id="5" name="Picture 4"/>
+          <p:cNvPicPr/>
+          <p:nvPr/>
+        </p:nvPicPr>
+        <p:blipFill rotWithShape="1">
+          <a:blip r:embed="rId2" cstate="print">
+            <a:extLst>
+              <a:ext uri="{28A0092B-C50C-407E-A947-70E740481C1C}">
+                <a14:useLocalDpi xmlns:a14="http://schemas.microsoft.com/office/drawing/2010/main" val="0"/>
+              </a:ext>
+            </a:extLst>
+          </a:blip>
+          <a:srcRect l="481" t="12250" r="21795" b="21938"/>
+          <a:stretch/>
+        </p:blipFill>
+        <p:spPr bwMode="auto">
+          <a:xfrm>
+            <a:off x="4044876" y="2008709"/>
+            <a:ext cx="7110804" cy="3697410"/>
+          </a:xfrm>
+          <a:prstGeom prst="rect">
+            <a:avLst/>
+          </a:prstGeom>
+          <a:ln>
+            <a:noFill/>
+          </a:ln>
+          <a:extLst>
+            <a:ext uri="{53640926-AAD7-44D8-BBD7-CCE9431645EC}">
+              <a14:shadowObscured xmlns:a14="http://schemas.microsoft.com/office/drawing/2010/main"/>
+            </a:ext>
+          </a:extLst>
+        </p:spPr>
+      </p:pic>
+      <p:pic>
+        <p:nvPicPr>
+          <p:cNvPr id="6" name="Picture 5"/>
           <p:cNvPicPr>
             <a:picLocks noChangeAspect="1"/>
           </p:cNvPicPr>
           <p:nvPr/>
         </p:nvPicPr>
         <p:blipFill>
-          <a:blip r:embed="rId2">
+          <a:blip r:embed="rId3">
             <a:extLst>
               <a:ext uri="{28A0092B-C50C-407E-A947-70E740481C1C}">
                 <a14:useLocalDpi xmlns:a14="http://schemas.microsoft.com/office/drawing/2010/main" val="0"/>
@@ -4924,18 +5499,31 @@
         </p:blipFill>
         <p:spPr>
           <a:xfrm>
-            <a:off x="6686117" y="2204826"/>
-            <a:ext cx="4181475" cy="3305175"/>
-          </a:xfrm>
-          <a:prstGeom prst="rect">
-            <a:avLst/>
+            <a:off x="9181129" y="0"/>
+            <a:ext cx="1245512" cy="1721852"/>
+          </a:xfrm>
+          <a:prstGeom prst="roundRect">
+            <a:avLst>
+              <a:gd name="adj" fmla="val 8594"/>
+            </a:avLst>
           </a:prstGeom>
+          <a:solidFill>
+            <a:srgbClr val="FFFFFF">
+              <a:shade val="85000"/>
+            </a:srgbClr>
+          </a:solidFill>
+          <a:ln>
+            <a:noFill/>
+          </a:ln>
+          <a:effectLst>
+            <a:reflection blurRad="12700" stA="38000" endPos="28000" dist="5000" dir="5400000" sy="-100000" algn="bl" rotWithShape="0"/>
+          </a:effectLst>
         </p:spPr>
       </p:pic>
     </p:spTree>
     <p:extLst>
       <p:ext uri="{BB962C8B-B14F-4D97-AF65-F5344CB8AC3E}">
-        <p14:creationId xmlns:p14="http://schemas.microsoft.com/office/powerpoint/2010/main" val="204447137"/>
+        <p14:creationId xmlns:p14="http://schemas.microsoft.com/office/powerpoint/2010/main" val="399732649"/>
       </p:ext>
     </p:extLst>
   </p:cSld>
@@ -4979,14 +5567,26 @@
             <p:ph type="title"/>
           </p:nvPr>
         </p:nvSpPr>
-        <p:spPr/>
+        <p:spPr>
+          <a:xfrm>
+            <a:off x="457200" y="594359"/>
+            <a:ext cx="3200400" cy="1178294"/>
+          </a:xfrm>
+        </p:spPr>
         <p:txBody>
           <a:bodyPr/>
           <a:lstStyle/>
           <a:p>
             <a:r>
               <a:rPr lang="en-US" dirty="0" smtClean="0"/>
-              <a:t>User Interface and Menus</a:t>
+              <a:t>Main Menu </a:t>
+            </a:r>
+            <a:br>
+              <a:rPr lang="en-US" dirty="0" smtClean="0"/>
+            </a:br>
+            <a:r>
+              <a:rPr lang="en-US" dirty="0" smtClean="0"/>
+              <a:t>Flow Diagram</a:t>
             </a:r>
             <a:endParaRPr lang="en-US" dirty="0"/>
           </a:p>
@@ -4994,66 +5594,196 @@
       </p:sp>
       <p:sp>
         <p:nvSpPr>
-          <p:cNvPr id="3" name="Content Placeholder 2"/>
-          <p:cNvSpPr>
-            <a:spLocks noGrp="1"/>
-          </p:cNvSpPr>
-          <p:nvPr>
-            <p:ph idx="1"/>
-          </p:nvPr>
-        </p:nvSpPr>
-        <p:spPr/>
-        <p:txBody>
-          <a:bodyPr>
-            <a:normAutofit/>
+          <p:cNvPr id="15" name="Text Placeholder 14"/>
+          <p:cNvSpPr>
+            <a:spLocks noGrp="1"/>
+          </p:cNvSpPr>
+          <p:nvPr>
+            <p:ph type="body" sz="half" idx="2"/>
+          </p:nvPr>
+        </p:nvSpPr>
+        <p:spPr>
+          <a:xfrm>
+            <a:off x="457200" y="1852863"/>
+            <a:ext cx="3200400" cy="4452341"/>
+          </a:xfrm>
+        </p:spPr>
+        <p:txBody>
+          <a:bodyPr/>
+          <a:lstStyle/>
+          <a:p>
+            <a:pPr marL="285750" indent="-285750">
+              <a:buFont typeface="Wingdings" panose="05000000000000000000" pitchFamily="2" charset="2"/>
+              <a:buChar char="q"/>
+            </a:pPr>
+            <a:r>
+              <a:rPr lang="en-US" dirty="0" smtClean="0"/>
+              <a:t>Represent Wayne State</a:t>
+            </a:r>
+          </a:p>
+          <a:p>
+            <a:pPr marL="285750" indent="-285750">
+              <a:buFont typeface="Wingdings" panose="05000000000000000000" pitchFamily="2" charset="2"/>
+              <a:buChar char="q"/>
+            </a:pPr>
+            <a:r>
+              <a:rPr lang="en-US" dirty="0" smtClean="0"/>
+              <a:t>Simple</a:t>
+            </a:r>
+          </a:p>
+          <a:p>
+            <a:pPr marL="285750" indent="-285750">
+              <a:buFont typeface="Wingdings" panose="05000000000000000000" pitchFamily="2" charset="2"/>
+              <a:buChar char="q"/>
+            </a:pPr>
+            <a:r>
+              <a:rPr lang="en-US" dirty="0" smtClean="0"/>
+              <a:t>Intuitive Navigation</a:t>
+            </a:r>
+            <a:endParaRPr lang="en-US" dirty="0"/>
+          </a:p>
+        </p:txBody>
+      </p:sp>
+      <p:sp>
+        <p:nvSpPr>
+          <p:cNvPr id="16" name="Rectangle 6"/>
+          <p:cNvSpPr>
+            <a:spLocks noChangeArrowheads="1"/>
+          </p:cNvSpPr>
+          <p:nvPr/>
+        </p:nvSpPr>
+        <p:spPr bwMode="auto">
+          <a:xfrm>
+            <a:off x="4734889" y="594359"/>
+            <a:ext cx="13537720" cy="45719"/>
+          </a:xfrm>
+          <a:prstGeom prst="rect">
+            <a:avLst/>
+          </a:prstGeom>
+          <a:noFill/>
+          <a:ln>
+            <a:noFill/>
+          </a:ln>
+          <a:effectLst/>
+          <a:extLst>
+            <a:ext uri="{909E8E84-426E-40DD-AFC4-6F175D3DCCD1}">
+              <a14:hiddenFill xmlns:a14="http://schemas.microsoft.com/office/drawing/2010/main">
+                <a:solidFill>
+                  <a:schemeClr val="accent1"/>
+                </a:solidFill>
+              </a14:hiddenFill>
+            </a:ext>
+            <a:ext uri="{91240B29-F687-4F45-9708-019B960494DF}">
+              <a14:hiddenLine xmlns:a14="http://schemas.microsoft.com/office/drawing/2010/main" w="9525">
+                <a:solidFill>
+                  <a:schemeClr val="tx1"/>
+                </a:solidFill>
+                <a:miter lim="800000"/>
+                <a:headEnd/>
+                <a:tailEnd/>
+              </a14:hiddenLine>
+            </a:ext>
+            <a:ext uri="{AF507438-7753-43E0-B8FC-AC1667EBCBE1}">
+              <a14:hiddenEffects xmlns:a14="http://schemas.microsoft.com/office/drawing/2010/main">
+                <a:effectLst>
+                  <a:outerShdw dist="35921" dir="2700000" algn="ctr" rotWithShape="0">
+                    <a:schemeClr val="bg2"/>
+                  </a:outerShdw>
+                </a:effectLst>
+              </a14:hiddenEffects>
+            </a:ext>
+          </a:extLst>
+        </p:spPr>
+        <p:txBody>
+          <a:bodyPr vert="horz" wrap="square" lIns="91440" tIns="45720" rIns="91440" bIns="45720" numCol="1" anchor="ctr" anchorCtr="0" compatLnSpc="1">
+            <a:prstTxWarp prst="textNoShape">
+              <a:avLst/>
+            </a:prstTxWarp>
+            <a:spAutoFit/>
           </a:bodyPr>
           <a:lstStyle/>
           <a:p>
-            <a:pPr>
-              <a:buFont typeface="Courier New" panose="02070309020205020404" pitchFamily="49" charset="0"/>
-              <a:buChar char="o"/>
-            </a:pPr>
-            <a:r>
-              <a:rPr lang="en-US" dirty="0" smtClean="0"/>
-              <a:t>FIRST LINE</a:t>
-            </a:r>
-          </a:p>
-          <a:p>
-            <a:pPr>
-              <a:buFont typeface="Courier New" panose="02070309020205020404" pitchFamily="49" charset="0"/>
-              <a:buChar char="o"/>
-            </a:pPr>
-            <a:r>
-              <a:rPr lang="en-US" sz="2000" dirty="0" smtClean="0"/>
-              <a:t>SECOND LINE</a:t>
-            </a:r>
-          </a:p>
-          <a:p>
-            <a:pPr>
-              <a:buFont typeface="Courier New" panose="02070309020205020404" pitchFamily="49" charset="0"/>
-              <a:buChar char="o"/>
-            </a:pPr>
-            <a:r>
-              <a:rPr lang="en-US" dirty="0" smtClean="0"/>
-              <a:t>THIRD LINE</a:t>
-            </a:r>
-            <a:endParaRPr lang="en-US" sz="2000" dirty="0" smtClean="0"/>
-          </a:p>
-          <a:p>
-            <a:endParaRPr lang="en-US" dirty="0"/>
-          </a:p>
-        </p:txBody>
-      </p:sp>
+            <a:endParaRPr lang="en-US"/>
+          </a:p>
+        </p:txBody>
+      </p:sp>
+      <p:graphicFrame>
+        <p:nvGraphicFramePr>
+          <p:cNvPr id="17" name="Object 16"/>
+          <p:cNvGraphicFramePr>
+            <a:graphicFrameLocks noChangeAspect="1"/>
+          </p:cNvGraphicFramePr>
+          <p:nvPr>
+            <p:extLst>
+              <p:ext uri="{D42A27DB-BD31-4B8C-83A1-F6EECF244321}">
+                <p14:modId xmlns:p14="http://schemas.microsoft.com/office/powerpoint/2010/main" val="4285095334"/>
+              </p:ext>
+            </p:extLst>
+          </p:nvPr>
+        </p:nvGraphicFramePr>
+        <p:xfrm>
+          <a:off x="4734889" y="490085"/>
+          <a:ext cx="6430417" cy="5922753"/>
+        </p:xfrm>
+        <a:graphic>
+          <a:graphicData uri="http://schemas.openxmlformats.org/presentationml/2006/ole">
+            <mc:AlternateContent xmlns:mc="http://schemas.openxmlformats.org/markup-compatibility/2006">
+              <mc:Choice xmlns:v="urn:schemas-microsoft-com:vml" Requires="v">
+                <p:oleObj spid="_x0000_s1034" r:id="rId3" imgW="6639011" imgH="6105658" progId="Visio.Drawing.15">
+                  <p:embed/>
+                </p:oleObj>
+              </mc:Choice>
+              <mc:Fallback>
+                <p:oleObj r:id="rId3" imgW="6639011" imgH="6105658" progId="Visio.Drawing.15">
+                  <p:embed/>
+                  <p:pic>
+                    <p:nvPicPr>
+                      <p:cNvPr id="0" name="Object 5"/>
+                      <p:cNvPicPr>
+                        <a:picLocks noChangeAspect="1" noChangeArrowheads="1"/>
+                      </p:cNvPicPr>
+                      <p:nvPr/>
+                    </p:nvPicPr>
+                    <p:blipFill>
+                      <a:blip r:embed="rId4">
+                        <a:extLst>
+                          <a:ext uri="{28A0092B-C50C-407E-A947-70E740481C1C}">
+                            <a14:useLocalDpi xmlns:a14="http://schemas.microsoft.com/office/drawing/2010/main" val="0"/>
+                          </a:ext>
+                        </a:extLst>
+                      </a:blip>
+                      <a:srcRect/>
+                      <a:stretch>
+                        <a:fillRect/>
+                      </a:stretch>
+                    </p:blipFill>
+                    <p:spPr bwMode="auto">
+                      <a:xfrm>
+                        <a:off x="4734889" y="490085"/>
+                        <a:ext cx="6430417" cy="5922753"/>
+                      </a:xfrm>
+                      <a:prstGeom prst="rect">
+                        <a:avLst/>
+                      </a:prstGeom>
+                      <a:noFill/>
+                    </p:spPr>
+                  </p:pic>
+                </p:oleObj>
+              </mc:Fallback>
+            </mc:AlternateContent>
+          </a:graphicData>
+        </a:graphic>
+      </p:graphicFrame>
       <p:pic>
         <p:nvPicPr>
-          <p:cNvPr id="4" name="Picture 3"/>
+          <p:cNvPr id="18" name="Picture 17"/>
           <p:cNvPicPr>
             <a:picLocks noChangeAspect="1"/>
           </p:cNvPicPr>
           <p:nvPr/>
         </p:nvPicPr>
         <p:blipFill>
-          <a:blip r:embed="rId2">
+          <a:blip r:embed="rId5">
             <a:extLst>
               <a:ext uri="{28A0092B-C50C-407E-A947-70E740481C1C}">
                 <a14:useLocalDpi xmlns:a14="http://schemas.microsoft.com/office/drawing/2010/main" val="0"/>
@@ -5066,18 +5796,31 @@
         </p:blipFill>
         <p:spPr>
           <a:xfrm>
-            <a:off x="6234139" y="2524990"/>
-            <a:ext cx="5191704" cy="3085234"/>
-          </a:xfrm>
-          <a:prstGeom prst="rect">
-            <a:avLst/>
+            <a:off x="4455493" y="390031"/>
+            <a:ext cx="1121937" cy="1586950"/>
+          </a:xfrm>
+          <a:prstGeom prst="roundRect">
+            <a:avLst>
+              <a:gd name="adj" fmla="val 8594"/>
+            </a:avLst>
           </a:prstGeom>
+          <a:solidFill>
+            <a:srgbClr val="FFFFFF">
+              <a:shade val="85000"/>
+            </a:srgbClr>
+          </a:solidFill>
+          <a:ln>
+            <a:noFill/>
+          </a:ln>
+          <a:effectLst>
+            <a:reflection blurRad="12700" stA="38000" endPos="28000" dist="5000" dir="5400000" sy="-100000" algn="bl" rotWithShape="0"/>
+          </a:effectLst>
         </p:spPr>
       </p:pic>
     </p:spTree>
     <p:extLst>
       <p:ext uri="{BB962C8B-B14F-4D97-AF65-F5344CB8AC3E}">
-        <p14:creationId xmlns:p14="http://schemas.microsoft.com/office/powerpoint/2010/main" val="399732649"/>
+        <p14:creationId xmlns:p14="http://schemas.microsoft.com/office/powerpoint/2010/main" val="22143993"/>
       </p:ext>
     </p:extLst>
   </p:cSld>
@@ -5172,7 +5915,6 @@
               <a:rPr lang="en-US" sz="2800" dirty="0" smtClean="0"/>
               <a:t>Terrain</a:t>
             </a:r>
-            <a:endParaRPr lang="en-US" sz="2800" dirty="0" smtClean="0"/>
           </a:p>
           <a:p>
             <a:pPr marL="457200" indent="-457200">
@@ -5193,7 +5935,6 @@
               <a:rPr lang="en-US" sz="2800" dirty="0" smtClean="0"/>
               <a:t>Special Effects</a:t>
             </a:r>
-            <a:endParaRPr lang="en-US" sz="2800" dirty="0" smtClean="0"/>
           </a:p>
           <a:p>
             <a:pPr marL="457200" indent="-457200">
@@ -5204,20 +5945,152 @@
               <a:rPr lang="en-US" sz="2800" dirty="0" smtClean="0"/>
               <a:t>Marketing and Packaging Art</a:t>
             </a:r>
-            <a:endParaRPr lang="en-US" sz="2800" dirty="0" smtClean="0"/>
           </a:p>
         </p:txBody>
       </p:sp>
       <p:pic>
         <p:nvPicPr>
-          <p:cNvPr id="3" name="Picture 2"/>
-          <p:cNvPicPr>
-            <a:picLocks noChangeAspect="1"/>
-          </p:cNvPicPr>
+          <p:cNvPr id="6" name="Picture 5"/>
+          <p:cNvPicPr/>
+          <p:nvPr/>
+        </p:nvPicPr>
+        <p:blipFill rotWithShape="1">
+          <a:blip r:embed="rId2">
+            <a:extLst>
+              <a:ext uri="{28A0092B-C50C-407E-A947-70E740481C1C}">
+                <a14:useLocalDpi xmlns:a14="http://schemas.microsoft.com/office/drawing/2010/main" val="0"/>
+              </a:ext>
+            </a:extLst>
+          </a:blip>
+          <a:srcRect l="47795" t="15453" r="40186" b="41545"/>
+          <a:stretch/>
+        </p:blipFill>
+        <p:spPr bwMode="auto">
+          <a:xfrm>
+            <a:off x="5453380" y="1291319"/>
+            <a:ext cx="1275715" cy="2568575"/>
+          </a:xfrm>
+          <a:prstGeom prst="roundRect">
+            <a:avLst>
+              <a:gd name="adj" fmla="val 8594"/>
+            </a:avLst>
+          </a:prstGeom>
+          <a:solidFill>
+            <a:srgbClr val="FFFFFF">
+              <a:shade val="85000"/>
+            </a:srgbClr>
+          </a:solidFill>
+          <a:ln>
+            <a:noFill/>
+          </a:ln>
+          <a:effectLst>
+            <a:reflection blurRad="12700" stA="38000" endPos="28000" dist="5000" dir="5400000" sy="-100000" algn="bl" rotWithShape="0"/>
+          </a:effectLst>
+          <a:extLst>
+            <a:ext uri="{53640926-AAD7-44D8-BBD7-CCE9431645EC}">
+              <a14:shadowObscured xmlns:a14="http://schemas.microsoft.com/office/drawing/2010/main"/>
+            </a:ext>
+          </a:extLst>
+        </p:spPr>
+      </p:pic>
+      <p:pic>
+        <p:nvPicPr>
+          <p:cNvPr id="9" name="Picture 8"/>
+          <p:cNvPicPr/>
+          <p:nvPr/>
+        </p:nvPicPr>
+        <p:blipFill rotWithShape="1">
+          <a:blip r:embed="rId3">
+            <a:extLst>
+              <a:ext uri="{28A0092B-C50C-407E-A947-70E740481C1C}">
+                <a14:useLocalDpi xmlns:a14="http://schemas.microsoft.com/office/drawing/2010/main" val="0"/>
+              </a:ext>
+            </a:extLst>
+          </a:blip>
+          <a:srcRect l="26923" t="34188" r="15064" b="41880"/>
+          <a:stretch/>
+        </p:blipFill>
+        <p:spPr bwMode="auto">
+          <a:xfrm>
+            <a:off x="5453380" y="4989513"/>
+            <a:ext cx="5417820" cy="1257300"/>
+          </a:xfrm>
+          <a:prstGeom prst="roundRect">
+            <a:avLst>
+              <a:gd name="adj" fmla="val 8594"/>
+            </a:avLst>
+          </a:prstGeom>
+          <a:solidFill>
+            <a:srgbClr val="FFFFFF">
+              <a:shade val="85000"/>
+            </a:srgbClr>
+          </a:solidFill>
+          <a:ln>
+            <a:noFill/>
+          </a:ln>
+          <a:effectLst>
+            <a:reflection blurRad="12700" stA="38000" endPos="28000" dist="5000" dir="5400000" sy="-100000" algn="bl" rotWithShape="0"/>
+          </a:effectLst>
+          <a:extLst>
+            <a:ext uri="{53640926-AAD7-44D8-BBD7-CCE9431645EC}">
+              <a14:shadowObscured xmlns:a14="http://schemas.microsoft.com/office/drawing/2010/main"/>
+            </a:ext>
+          </a:extLst>
+        </p:spPr>
+      </p:pic>
+      <p:pic>
+        <p:nvPicPr>
+          <p:cNvPr id="10" name="Picture 9"/>
+          <p:cNvPicPr/>
+          <p:nvPr/>
+        </p:nvPicPr>
+        <p:blipFill rotWithShape="1">
+          <a:blip r:embed="rId4" cstate="print">
+            <a:extLst>
+              <a:ext uri="{28A0092B-C50C-407E-A947-70E740481C1C}">
+                <a14:useLocalDpi xmlns:a14="http://schemas.microsoft.com/office/drawing/2010/main" val="0"/>
+              </a:ext>
+            </a:extLst>
+          </a:blip>
+          <a:srcRect l="50481" t="8548" r="27244" b="51851"/>
+          <a:stretch/>
+        </p:blipFill>
+        <p:spPr bwMode="auto">
+          <a:xfrm>
+            <a:off x="8323200" y="1291319"/>
+            <a:ext cx="2501046" cy="2568575"/>
+          </a:xfrm>
+          <a:prstGeom prst="roundRect">
+            <a:avLst>
+              <a:gd name="adj" fmla="val 8594"/>
+            </a:avLst>
+          </a:prstGeom>
+          <a:solidFill>
+            <a:srgbClr val="FFFFFF">
+              <a:shade val="85000"/>
+            </a:srgbClr>
+          </a:solidFill>
+          <a:ln>
+            <a:noFill/>
+          </a:ln>
+          <a:effectLst>
+            <a:reflection blurRad="12700" stA="38000" endPos="28000" dist="5000" dir="5400000" sy="-100000" algn="bl" rotWithShape="0"/>
+          </a:effectLst>
+          <a:extLst>
+            <a:ext uri="{53640926-AAD7-44D8-BBD7-CCE9431645EC}">
+              <a14:shadowObscured xmlns:a14="http://schemas.microsoft.com/office/drawing/2010/main"/>
+            </a:ext>
+          </a:extLst>
+        </p:spPr>
+      </p:pic>
+      <p:pic>
+        <p:nvPicPr>
+          <p:cNvPr id="12" name="Picture 11"/>
+          <p:cNvPicPr/>
           <p:nvPr/>
         </p:nvPicPr>
         <p:blipFill>
-          <a:blip r:embed="rId2">
+          <a:blip r:embed="rId5">
             <a:extLst>
               <a:ext uri="{28A0092B-C50C-407E-A947-70E740481C1C}">
                 <a14:useLocalDpi xmlns:a14="http://schemas.microsoft.com/office/drawing/2010/main" val="0"/>
@@ -5230,14 +6103,143 @@
         </p:blipFill>
         <p:spPr>
           <a:xfrm>
-            <a:off x="4489318" y="1414585"/>
-            <a:ext cx="7339124" cy="4159827"/>
+            <a:off x="1537188" y="4989513"/>
+            <a:ext cx="723900" cy="942975"/>
           </a:xfrm>
           <a:prstGeom prst="rect">
             <a:avLst/>
           </a:prstGeom>
+          <a:ln w="228600" cap="sq" cmpd="thickThin">
+            <a:solidFill>
+              <a:schemeClr val="accent2">
+                <a:lumMod val="75000"/>
+              </a:schemeClr>
+            </a:solidFill>
+            <a:prstDash val="solid"/>
+            <a:miter lim="800000"/>
+          </a:ln>
+          <a:effectLst>
+            <a:innerShdw blurRad="76200">
+              <a:srgbClr val="000000"/>
+            </a:innerShdw>
+          </a:effectLst>
         </p:spPr>
       </p:pic>
+      <p:sp>
+        <p:nvSpPr>
+          <p:cNvPr id="15" name="Rectangle 14"/>
+          <p:cNvSpPr/>
+          <p:nvPr/>
+        </p:nvSpPr>
+        <p:spPr>
+          <a:xfrm>
+            <a:off x="6836606" y="4020050"/>
+            <a:ext cx="2260501" cy="916911"/>
+          </a:xfrm>
+          <a:prstGeom prst="rect">
+            <a:avLst/>
+          </a:prstGeom>
+          <a:noFill/>
+        </p:spPr>
+        <p:txBody>
+          <a:bodyPr wrap="square" lIns="91440" tIns="45720" rIns="91440" bIns="45720">
+            <a:spAutoFit/>
+          </a:bodyPr>
+          <a:lstStyle/>
+          <a:p>
+            <a:pPr algn="ctr"/>
+            <a:r>
+              <a:rPr lang="en-US" sz="5400" b="1" cap="none" spc="0" dirty="0" smtClean="0">
+                <a:ln w="13462">
+                  <a:solidFill>
+                    <a:schemeClr val="bg1"/>
+                  </a:solidFill>
+                  <a:prstDash val="solid"/>
+                </a:ln>
+                <a:solidFill>
+                  <a:schemeClr val="tx1">
+                    <a:lumMod val="85000"/>
+                    <a:lumOff val="15000"/>
+                  </a:schemeClr>
+                </a:solidFill>
+                <a:effectLst>
+                  <a:outerShdw dist="38100" dir="2700000" algn="bl" rotWithShape="0">
+                    <a:schemeClr val="accent5"/>
+                  </a:outerShdw>
+                </a:effectLst>
+              </a:rPr>
+              <a:t>Puzzles</a:t>
+            </a:r>
+            <a:endParaRPr lang="en-US" sz="5400" b="1" cap="none" spc="0" dirty="0">
+              <a:ln w="13462">
+                <a:solidFill>
+                  <a:schemeClr val="bg1"/>
+                </a:solidFill>
+                <a:prstDash val="solid"/>
+              </a:ln>
+              <a:solidFill>
+                <a:schemeClr val="tx1">
+                  <a:lumMod val="85000"/>
+                  <a:lumOff val="15000"/>
+                </a:schemeClr>
+              </a:solidFill>
+              <a:effectLst>
+                <a:outerShdw dist="38100" dir="2700000" algn="bl" rotWithShape="0">
+                  <a:schemeClr val="accent5"/>
+                </a:outerShdw>
+              </a:effectLst>
+            </a:endParaRPr>
+          </a:p>
+        </p:txBody>
+      </p:sp>
+      <p:sp>
+        <p:nvSpPr>
+          <p:cNvPr id="16" name="Rectangle 15"/>
+          <p:cNvSpPr/>
+          <p:nvPr/>
+        </p:nvSpPr>
+        <p:spPr>
+          <a:xfrm>
+            <a:off x="6547570" y="315437"/>
+            <a:ext cx="2947987" cy="923330"/>
+          </a:xfrm>
+          <a:prstGeom prst="rect">
+            <a:avLst/>
+          </a:prstGeom>
+          <a:noFill/>
+        </p:spPr>
+        <p:txBody>
+          <a:bodyPr wrap="none" lIns="91440" tIns="45720" rIns="91440" bIns="45720">
+            <a:spAutoFit/>
+          </a:bodyPr>
+          <a:lstStyle/>
+          <a:p>
+            <a:pPr algn="ctr"/>
+            <a:r>
+              <a:rPr lang="en-US" sz="5400" b="1" cap="none" spc="0" dirty="0" smtClean="0">
+                <a:ln w="13462">
+                  <a:solidFill>
+                    <a:schemeClr val="bg1"/>
+                  </a:solidFill>
+                  <a:prstDash val="solid"/>
+                </a:ln>
+                <a:solidFill>
+                  <a:schemeClr val="tx1">
+                    <a:lumMod val="85000"/>
+                    <a:lumOff val="15000"/>
+                  </a:schemeClr>
+                </a:solidFill>
+                <a:effectLst>
+                  <a:outerShdw dist="38100" dir="2700000" algn="bl" rotWithShape="0">
+                    <a:schemeClr val="accent5"/>
+                  </a:outerShdw>
+                </a:effectLst>
+              </a:rPr>
+              <a:t>Obstacles</a:t>
+            </a:r>
+          </a:p>
+        </p:txBody>
+      </p:sp>
     </p:spTree>
     <p:extLst>
       <p:ext uri="{BB962C8B-B14F-4D97-AF65-F5344CB8AC3E}">
@@ -5305,15 +6307,10 @@
             <a:spLocks noGrp="1"/>
           </p:cNvSpPr>
           <p:nvPr>
-            <p:ph idx="1"/>
-          </p:nvPr>
-        </p:nvSpPr>
-        <p:spPr>
-          <a:xfrm>
-            <a:off x="5569526" y="1845734"/>
-            <a:ext cx="5586153" cy="4023360"/>
-          </a:xfrm>
-        </p:spPr>
+            <p:ph sz="half" idx="1"/>
+          </p:nvPr>
+        </p:nvSpPr>
+        <p:spPr/>
         <p:txBody>
           <a:bodyPr>
             <a:normAutofit/>
@@ -5326,22 +6323,212 @@
             </a:pPr>
             <a:r>
               <a:rPr lang="en-US" sz="2800" dirty="0" smtClean="0"/>
-              <a:t>Audio Sources</a:t>
-            </a:r>
-            <a:endParaRPr lang="en-US" sz="2800" dirty="0" smtClean="0"/>
-          </a:p>
-        </p:txBody>
-      </p:sp>
+              <a:t>Music</a:t>
+            </a:r>
+          </a:p>
+          <a:p>
+            <a:pPr lvl="1">
+              <a:buFont typeface="Courier New" panose="02070309020205020404" pitchFamily="49" charset="0"/>
+              <a:buChar char="o"/>
+            </a:pPr>
+            <a:r>
+              <a:rPr lang="en-US" sz="2600" dirty="0" smtClean="0"/>
+              <a:t>Ambiance</a:t>
+            </a:r>
+          </a:p>
+          <a:p>
+            <a:pPr lvl="1">
+              <a:buFont typeface="Courier New" panose="02070309020205020404" pitchFamily="49" charset="0"/>
+              <a:buChar char="o"/>
+            </a:pPr>
+            <a:r>
+              <a:rPr lang="en-US" sz="2600" dirty="0" smtClean="0"/>
+              <a:t>Combat</a:t>
+            </a:r>
+          </a:p>
+          <a:p>
+            <a:pPr lvl="1">
+              <a:buFont typeface="Courier New" panose="02070309020205020404" pitchFamily="49" charset="0"/>
+              <a:buChar char="o"/>
+            </a:pPr>
+            <a:r>
+              <a:rPr lang="en-US" sz="2600" dirty="0" smtClean="0"/>
+              <a:t>Menu</a:t>
+            </a:r>
+          </a:p>
+          <a:p>
+            <a:pPr>
+              <a:buFont typeface="Courier New" panose="02070309020205020404" pitchFamily="49" charset="0"/>
+              <a:buChar char="o"/>
+            </a:pPr>
+            <a:r>
+              <a:rPr lang="en-US" sz="2800" dirty="0" smtClean="0"/>
+              <a:t>Sounds with animations</a:t>
+            </a:r>
+          </a:p>
+          <a:p>
+            <a:pPr>
+              <a:buFont typeface="Courier New" panose="02070309020205020404" pitchFamily="49" charset="0"/>
+              <a:buChar char="o"/>
+            </a:pPr>
+            <a:r>
+              <a:rPr lang="en-US" sz="2800" dirty="0" smtClean="0"/>
+              <a:t>Sounds with particles</a:t>
+            </a:r>
+          </a:p>
+          <a:p>
+            <a:pPr>
+              <a:buFont typeface="Courier New" panose="02070309020205020404" pitchFamily="49" charset="0"/>
+              <a:buChar char="o"/>
+            </a:pPr>
+            <a:r>
+              <a:rPr lang="en-US" sz="2800" dirty="0" smtClean="0"/>
+              <a:t>Grunts</a:t>
+            </a:r>
+            <a:endParaRPr lang="en-US" sz="2800" dirty="0"/>
+          </a:p>
+        </p:txBody>
+      </p:sp>
+      <p:sp>
+        <p:nvSpPr>
+          <p:cNvPr id="6" name="Rectangle 2"/>
+          <p:cNvSpPr>
+            <a:spLocks noChangeArrowheads="1"/>
+          </p:cNvSpPr>
+          <p:nvPr/>
+        </p:nvSpPr>
+        <p:spPr bwMode="auto">
+          <a:xfrm>
+            <a:off x="5221605" y="1594339"/>
+            <a:ext cx="12192000" cy="0"/>
+          </a:xfrm>
+          <a:prstGeom prst="rect">
+            <a:avLst/>
+          </a:prstGeom>
+          <a:noFill/>
+          <a:ln>
+            <a:noFill/>
+          </a:ln>
+          <a:effectLst/>
+          <a:extLst>
+            <a:ext uri="{909E8E84-426E-40DD-AFC4-6F175D3DCCD1}">
+              <a14:hiddenFill xmlns:a14="http://schemas.microsoft.com/office/drawing/2010/main">
+                <a:solidFill>
+                  <a:schemeClr val="accent1"/>
+                </a:solidFill>
+              </a14:hiddenFill>
+            </a:ext>
+            <a:ext uri="{91240B29-F687-4F45-9708-019B960494DF}">
+              <a14:hiddenLine xmlns:a14="http://schemas.microsoft.com/office/drawing/2010/main" w="9525">
+                <a:solidFill>
+                  <a:schemeClr val="tx1"/>
+                </a:solidFill>
+                <a:miter lim="800000"/>
+                <a:headEnd/>
+                <a:tailEnd/>
+              </a14:hiddenLine>
+            </a:ext>
+            <a:ext uri="{AF507438-7753-43E0-B8FC-AC1667EBCBE1}">
+              <a14:hiddenEffects xmlns:a14="http://schemas.microsoft.com/office/drawing/2010/main">
+                <a:effectLst>
+                  <a:outerShdw dist="35921" dir="2700000" algn="ctr" rotWithShape="0">
+                    <a:schemeClr val="bg2"/>
+                  </a:outerShdw>
+                </a:effectLst>
+              </a14:hiddenEffects>
+            </a:ext>
+          </a:extLst>
+        </p:spPr>
+        <p:txBody>
+          <a:bodyPr vert="horz" wrap="none" lIns="91440" tIns="45720" rIns="91440" bIns="45720" numCol="1" anchor="ctr" anchorCtr="0" compatLnSpc="1">
+            <a:prstTxWarp prst="textNoShape">
+              <a:avLst/>
+            </a:prstTxWarp>
+            <a:spAutoFit/>
+          </a:bodyPr>
+          <a:lstStyle/>
+          <a:p>
+            <a:endParaRPr lang="en-US"/>
+          </a:p>
+        </p:txBody>
+      </p:sp>
+      <p:graphicFrame>
+        <p:nvGraphicFramePr>
+          <p:cNvPr id="7" name="Object 6"/>
+          <p:cNvGraphicFramePr>
+            <a:graphicFrameLocks noChangeAspect="1"/>
+          </p:cNvGraphicFramePr>
+          <p:nvPr>
+            <p:extLst>
+              <p:ext uri="{D42A27DB-BD31-4B8C-83A1-F6EECF244321}">
+                <p14:modId xmlns:p14="http://schemas.microsoft.com/office/powerpoint/2010/main" val="1538604697"/>
+              </p:ext>
+            </p:extLst>
+          </p:nvPr>
+        </p:nvGraphicFramePr>
+        <p:xfrm>
+          <a:off x="5221605" y="1594339"/>
+          <a:ext cx="5934075" cy="4543425"/>
+        </p:xfrm>
+        <a:graphic>
+          <a:graphicData uri="http://schemas.openxmlformats.org/presentationml/2006/ole">
+            <mc:AlternateContent xmlns:mc="http://schemas.openxmlformats.org/markup-compatibility/2006">
+              <mc:Choice xmlns:v="urn:schemas-microsoft-com:vml" Requires="v">
+                <p:oleObj spid="_x0000_s6150" r:id="rId3" imgW="8886746" imgH="6800930" progId="Visio.Drawing.15">
+                  <p:embed/>
+                </p:oleObj>
+              </mc:Choice>
+              <mc:Fallback>
+                <p:oleObj r:id="rId3" imgW="8886746" imgH="6800930" progId="Visio.Drawing.15">
+                  <p:embed/>
+                  <p:pic>
+                    <p:nvPicPr>
+                      <p:cNvPr id="0" name="Object 1"/>
+                      <p:cNvPicPr>
+                        <a:picLocks noChangeAspect="1" noChangeArrowheads="1"/>
+                      </p:cNvPicPr>
+                      <p:nvPr/>
+                    </p:nvPicPr>
+                    <p:blipFill>
+                      <a:blip r:embed="rId4">
+                        <a:extLst>
+                          <a:ext uri="{28A0092B-C50C-407E-A947-70E740481C1C}">
+                            <a14:useLocalDpi xmlns:a14="http://schemas.microsoft.com/office/drawing/2010/main" val="0"/>
+                          </a:ext>
+                        </a:extLst>
+                      </a:blip>
+                      <a:srcRect/>
+                      <a:stretch>
+                        <a:fillRect/>
+                      </a:stretch>
+                    </p:blipFill>
+                    <p:spPr bwMode="auto">
+                      <a:xfrm>
+                        <a:off x="5221605" y="1594339"/>
+                        <a:ext cx="5934075" cy="4543425"/>
+                      </a:xfrm>
+                      <a:prstGeom prst="rect">
+                        <a:avLst/>
+                      </a:prstGeom>
+                      <a:noFill/>
+                    </p:spPr>
+                  </p:pic>
+                </p:oleObj>
+              </mc:Fallback>
+            </mc:AlternateContent>
+          </a:graphicData>
+        </a:graphic>
+      </p:graphicFrame>
       <p:pic>
         <p:nvPicPr>
-          <p:cNvPr id="4" name="Picture 3"/>
+          <p:cNvPr id="9" name="Picture 8"/>
           <p:cNvPicPr>
             <a:picLocks noChangeAspect="1"/>
           </p:cNvPicPr>
           <p:nvPr/>
         </p:nvPicPr>
         <p:blipFill>
-          <a:blip r:embed="rId2">
+          <a:blip r:embed="rId5">
             <a:extLst>
               <a:ext uri="{28A0092B-C50C-407E-A947-70E740481C1C}">
                 <a14:useLocalDpi xmlns:a14="http://schemas.microsoft.com/office/drawing/2010/main" val="0"/>
@@ -5354,8 +6541,68 @@
         </p:blipFill>
         <p:spPr>
           <a:xfrm>
-            <a:off x="1097279" y="2177487"/>
-            <a:ext cx="4264429" cy="3359853"/>
+            <a:off x="9593927" y="4290647"/>
+            <a:ext cx="565437" cy="679938"/>
+          </a:xfrm>
+          <a:prstGeom prst="rect">
+            <a:avLst/>
+          </a:prstGeom>
+        </p:spPr>
+      </p:pic>
+      <p:pic>
+        <p:nvPicPr>
+          <p:cNvPr id="10" name="Picture 9"/>
+          <p:cNvPicPr>
+            <a:picLocks noChangeAspect="1"/>
+          </p:cNvPicPr>
+          <p:nvPr/>
+        </p:nvPicPr>
+        <p:blipFill>
+          <a:blip r:embed="rId6">
+            <a:extLst>
+              <a:ext uri="{28A0092B-C50C-407E-A947-70E740481C1C}">
+                <a14:useLocalDpi xmlns:a14="http://schemas.microsoft.com/office/drawing/2010/main" val="0"/>
+              </a:ext>
+            </a:extLst>
+          </a:blip>
+          <a:stretch>
+            <a:fillRect/>
+          </a:stretch>
+        </p:blipFill>
+        <p:spPr>
+          <a:xfrm flipH="1">
+            <a:off x="5384799" y="5509845"/>
+            <a:ext cx="537425" cy="761971"/>
+          </a:xfrm>
+          <a:prstGeom prst="rect">
+            <a:avLst/>
+          </a:prstGeom>
+        </p:spPr>
+      </p:pic>
+      <p:pic>
+        <p:nvPicPr>
+          <p:cNvPr id="11" name="Picture 10"/>
+          <p:cNvPicPr>
+            <a:picLocks noChangeAspect="1"/>
+          </p:cNvPicPr>
+          <p:nvPr/>
+        </p:nvPicPr>
+        <p:blipFill>
+          <a:blip r:embed="rId7">
+            <a:extLst>
+              <a:ext uri="{28A0092B-C50C-407E-A947-70E740481C1C}">
+                <a14:useLocalDpi xmlns:a14="http://schemas.microsoft.com/office/drawing/2010/main" val="0"/>
+              </a:ext>
+            </a:extLst>
+          </a:blip>
+          <a:stretch>
+            <a:fillRect/>
+          </a:stretch>
+        </p:blipFill>
+        <p:spPr>
+          <a:xfrm>
+            <a:off x="7899198" y="2378767"/>
+            <a:ext cx="471079" cy="666329"/>
           </a:xfrm>
           <a:prstGeom prst="rect">
             <a:avLst/>
@@ -5459,7 +6706,39 @@
               <a:rPr lang="en-US" sz="2800" dirty="0" smtClean="0"/>
               <a:t>Player</a:t>
             </a:r>
-            <a:endParaRPr lang="en-US" sz="2800" dirty="0" smtClean="0"/>
+          </a:p>
+          <a:p>
+            <a:pPr marL="742950" lvl="1" indent="-285750">
+              <a:buFont typeface="Wingdings" panose="05000000000000000000" pitchFamily="2" charset="2"/>
+              <a:buChar char="q"/>
+            </a:pPr>
+            <a:r>
+              <a:rPr lang="en-US" sz="2500" dirty="0" smtClean="0">
+                <a:solidFill>
+                  <a:schemeClr val="bg1"/>
+                </a:solidFill>
+              </a:rPr>
+              <a:t>Health/Stamina</a:t>
+            </a:r>
+          </a:p>
+          <a:p>
+            <a:pPr marL="742950" lvl="1" indent="-285750">
+              <a:buFont typeface="Wingdings" panose="05000000000000000000" pitchFamily="2" charset="2"/>
+              <a:buChar char="q"/>
+            </a:pPr>
+            <a:r>
+              <a:rPr lang="en-US" sz="2500" dirty="0" smtClean="0">
+                <a:solidFill>
+                  <a:schemeClr val="bg1"/>
+                </a:solidFill>
+              </a:rPr>
+              <a:t>Animations</a:t>
+            </a:r>
+            <a:endParaRPr lang="en-US" sz="2500" dirty="0" smtClean="0">
+              <a:solidFill>
+                <a:schemeClr val="bg1"/>
+              </a:solidFill>
+            </a:endParaRPr>
           </a:p>
           <a:p>
             <a:pPr marL="285750" indent="-285750">
@@ -5468,9 +6747,27 @@
             </a:pPr>
             <a:r>
               <a:rPr lang="en-US" sz="2800" dirty="0" smtClean="0"/>
-              <a:t>Secondary</a:t>
-            </a:r>
-            <a:endParaRPr lang="en-US" sz="2800" dirty="0" smtClean="0"/>
+              <a:t>Friendly</a:t>
+            </a:r>
+          </a:p>
+          <a:p>
+            <a:pPr marL="742950" lvl="1" indent="-285750">
+              <a:buFont typeface="Wingdings" panose="05000000000000000000" pitchFamily="2" charset="2"/>
+              <a:buChar char="q"/>
+            </a:pPr>
+            <a:r>
+              <a:rPr lang="en-US" sz="2500" dirty="0" smtClean="0">
+                <a:solidFill>
+                  <a:schemeClr val="bg1"/>
+                </a:solidFill>
+              </a:rPr>
+              <a:t>Chat Bubble</a:t>
+            </a:r>
+            <a:endParaRPr lang="en-US" sz="2500" dirty="0" smtClean="0">
+              <a:solidFill>
+                <a:schemeClr val="bg1"/>
+              </a:solidFill>
+            </a:endParaRPr>
           </a:p>
           <a:p>
             <a:pPr marL="285750" indent="-285750">
@@ -5481,20 +6778,166 @@
               <a:rPr lang="en-US" sz="2800" dirty="0" smtClean="0"/>
               <a:t>Enemies</a:t>
             </a:r>
-            <a:endParaRPr lang="en-US" sz="2800" dirty="0" smtClean="0"/>
-          </a:p>
-        </p:txBody>
-      </p:sp>
+          </a:p>
+          <a:p>
+            <a:pPr marL="742950" lvl="1" indent="-285750">
+              <a:buFont typeface="Wingdings" panose="05000000000000000000" pitchFamily="2" charset="2"/>
+              <a:buChar char="q"/>
+            </a:pPr>
+            <a:r>
+              <a:rPr lang="en-US" sz="2500" dirty="0" smtClean="0">
+                <a:solidFill>
+                  <a:schemeClr val="bg1"/>
+                </a:solidFill>
+              </a:rPr>
+              <a:t>Vision Range</a:t>
+            </a:r>
+            <a:endParaRPr lang="en-US" sz="2500" dirty="0" smtClean="0">
+              <a:solidFill>
+                <a:schemeClr val="bg1"/>
+              </a:solidFill>
+            </a:endParaRPr>
+          </a:p>
+        </p:txBody>
+      </p:sp>
+      <p:sp>
+        <p:nvSpPr>
+          <p:cNvPr id="3" name="Rectangle 2"/>
+          <p:cNvSpPr>
+            <a:spLocks noChangeArrowheads="1"/>
+          </p:cNvSpPr>
+          <p:nvPr/>
+        </p:nvSpPr>
+        <p:spPr bwMode="auto">
+          <a:xfrm>
+            <a:off x="3712308" y="305771"/>
+            <a:ext cx="12046872" cy="45719"/>
+          </a:xfrm>
+          <a:prstGeom prst="rect">
+            <a:avLst/>
+          </a:prstGeom>
+          <a:noFill/>
+          <a:ln>
+            <a:noFill/>
+          </a:ln>
+          <a:effectLst/>
+          <a:extLst>
+            <a:ext uri="{909E8E84-426E-40DD-AFC4-6F175D3DCCD1}">
+              <a14:hiddenFill xmlns:a14="http://schemas.microsoft.com/office/drawing/2010/main">
+                <a:solidFill>
+                  <a:schemeClr val="accent1"/>
+                </a:solidFill>
+              </a14:hiddenFill>
+            </a:ext>
+            <a:ext uri="{91240B29-F687-4F45-9708-019B960494DF}">
+              <a14:hiddenLine xmlns:a14="http://schemas.microsoft.com/office/drawing/2010/main" w="9525">
+                <a:solidFill>
+                  <a:schemeClr val="tx1"/>
+                </a:solidFill>
+                <a:miter lim="800000"/>
+                <a:headEnd/>
+                <a:tailEnd/>
+              </a14:hiddenLine>
+            </a:ext>
+            <a:ext uri="{AF507438-7753-43E0-B8FC-AC1667EBCBE1}">
+              <a14:hiddenEffects xmlns:a14="http://schemas.microsoft.com/office/drawing/2010/main">
+                <a:effectLst>
+                  <a:outerShdw dist="35921" dir="2700000" algn="ctr" rotWithShape="0">
+                    <a:schemeClr val="bg2"/>
+                  </a:outerShdw>
+                </a:effectLst>
+              </a14:hiddenEffects>
+            </a:ext>
+          </a:extLst>
+        </p:spPr>
+        <p:txBody>
+          <a:bodyPr vert="horz" wrap="square" lIns="91440" tIns="45720" rIns="91440" bIns="45720" numCol="1" anchor="ctr" anchorCtr="0" compatLnSpc="1">
+            <a:prstTxWarp prst="textNoShape">
+              <a:avLst/>
+            </a:prstTxWarp>
+            <a:spAutoFit/>
+          </a:bodyPr>
+          <a:lstStyle/>
+          <a:p>
+            <a:endParaRPr lang="en-US"/>
+          </a:p>
+        </p:txBody>
+      </p:sp>
+      <p:graphicFrame>
+        <p:nvGraphicFramePr>
+          <p:cNvPr id="4" name="Object 3"/>
+          <p:cNvGraphicFramePr>
+            <a:graphicFrameLocks noChangeAspect="1"/>
+          </p:cNvGraphicFramePr>
+          <p:nvPr>
+            <p:extLst>
+              <p:ext uri="{D42A27DB-BD31-4B8C-83A1-F6EECF244321}">
+                <p14:modId xmlns:p14="http://schemas.microsoft.com/office/powerpoint/2010/main" val="2030080661"/>
+              </p:ext>
+            </p:extLst>
+          </p:nvPr>
+        </p:nvGraphicFramePr>
+        <p:xfrm>
+          <a:off x="3367403" y="414117"/>
+          <a:ext cx="8514560" cy="3179315"/>
+        </p:xfrm>
+        <a:graphic>
+          <a:graphicData uri="http://schemas.openxmlformats.org/presentationml/2006/ole">
+            <mc:AlternateContent xmlns:mc="http://schemas.openxmlformats.org/markup-compatibility/2006">
+              <mc:Choice xmlns:v="urn:schemas-microsoft-com:vml" Requires="v">
+                <p:oleObj spid="_x0000_s2055" r:id="rId3" imgW="9401254" imgH="7181837" progId="Visio.Drawing.15">
+                  <p:embed/>
+                </p:oleObj>
+              </mc:Choice>
+              <mc:Fallback>
+                <p:oleObj r:id="rId3" imgW="9401254" imgH="7181837" progId="Visio.Drawing.15">
+                  <p:embed/>
+                  <p:pic>
+                    <p:nvPicPr>
+                      <p:cNvPr id="0" name="Object 1"/>
+                      <p:cNvPicPr>
+                        <a:picLocks noChangeAspect="1" noChangeArrowheads="1"/>
+                      </p:cNvPicPr>
+                      <p:nvPr/>
+                    </p:nvPicPr>
+                    <p:blipFill>
+                      <a:blip r:embed="rId4">
+                        <a:extLst>
+                          <a:ext uri="{28A0092B-C50C-407E-A947-70E740481C1C}">
+                            <a14:useLocalDpi xmlns:a14="http://schemas.microsoft.com/office/drawing/2010/main" val="0"/>
+                          </a:ext>
+                        </a:extLst>
+                      </a:blip>
+                      <a:srcRect b="50943"/>
+                      <a:stretch>
+                        <a:fillRect/>
+                      </a:stretch>
+                    </p:blipFill>
+                    <p:spPr bwMode="auto">
+                      <a:xfrm>
+                        <a:off x="3367403" y="414117"/>
+                        <a:ext cx="8514560" cy="3179315"/>
+                      </a:xfrm>
+                      <a:prstGeom prst="rect">
+                        <a:avLst/>
+                      </a:prstGeom>
+                      <a:noFill/>
+                    </p:spPr>
+                  </p:pic>
+                </p:oleObj>
+              </mc:Fallback>
+            </mc:AlternateContent>
+          </a:graphicData>
+        </a:graphic>
+      </p:graphicFrame>
       <p:pic>
         <p:nvPicPr>
-          <p:cNvPr id="8" name="Picture 7"/>
-          <p:cNvPicPr>
-            <a:picLocks noChangeAspect="1"/>
-          </p:cNvPicPr>
+          <p:cNvPr id="9" name="Picture 8"/>
+          <p:cNvPicPr/>
           <p:nvPr/>
         </p:nvPicPr>
         <p:blipFill>
-          <a:blip r:embed="rId2">
+          <a:blip r:embed="rId5" cstate="print">
             <a:extLst>
               <a:ext uri="{28A0092B-C50C-407E-A947-70E740481C1C}">
                 <a14:useLocalDpi xmlns:a14="http://schemas.microsoft.com/office/drawing/2010/main" val="0"/>
@@ -5507,24 +6950,35 @@
         </p:blipFill>
         <p:spPr>
           <a:xfrm>
-            <a:off x="4441247" y="214312"/>
-            <a:ext cx="4514850" cy="6429375"/>
-          </a:xfrm>
-          <a:prstGeom prst="rect">
-            <a:avLst/>
+            <a:off x="4721005" y="4116994"/>
+            <a:ext cx="1952625" cy="2188210"/>
+          </a:xfrm>
+          <a:prstGeom prst="roundRect">
+            <a:avLst>
+              <a:gd name="adj" fmla="val 8594"/>
+            </a:avLst>
           </a:prstGeom>
+          <a:solidFill>
+            <a:srgbClr val="FFFFFF">
+              <a:shade val="85000"/>
+            </a:srgbClr>
+          </a:solidFill>
+          <a:ln>
+            <a:noFill/>
+          </a:ln>
+          <a:effectLst>
+            <a:reflection blurRad="12700" stA="38000" endPos="28000" dist="5000" dir="5400000" sy="-100000" algn="bl" rotWithShape="0"/>
+          </a:effectLst>
         </p:spPr>
       </p:pic>
       <p:pic>
         <p:nvPicPr>
-          <p:cNvPr id="22" name="Picture 21"/>
-          <p:cNvPicPr>
-            <a:picLocks noChangeAspect="1"/>
-          </p:cNvPicPr>
+          <p:cNvPr id="10" name="Picture 9"/>
+          <p:cNvPicPr/>
           <p:nvPr/>
         </p:nvPicPr>
         <p:blipFill>
-          <a:blip r:embed="rId3">
+          <a:blip r:embed="rId6" cstate="print">
             <a:extLst>
               <a:ext uri="{28A0092B-C50C-407E-A947-70E740481C1C}">
                 <a14:useLocalDpi xmlns:a14="http://schemas.microsoft.com/office/drawing/2010/main" val="0"/>
@@ -5537,12 +6991,66 @@
         </p:blipFill>
         <p:spPr>
           <a:xfrm>
-            <a:off x="9351818" y="1288640"/>
-            <a:ext cx="2514599" cy="4138102"/>
-          </a:xfrm>
-          <a:prstGeom prst="rect">
-            <a:avLst/>
+            <a:off x="7482353" y="4219229"/>
+            <a:ext cx="1598295" cy="2085975"/>
+          </a:xfrm>
+          <a:prstGeom prst="roundRect">
+            <a:avLst>
+              <a:gd name="adj" fmla="val 8594"/>
+            </a:avLst>
           </a:prstGeom>
+          <a:solidFill>
+            <a:srgbClr val="FFFFFF">
+              <a:shade val="85000"/>
+            </a:srgbClr>
+          </a:solidFill>
+          <a:ln>
+            <a:noFill/>
+          </a:ln>
+          <a:effectLst>
+            <a:reflection blurRad="12700" stA="38000" endPos="28000" dist="5000" dir="5400000" sy="-100000" algn="bl" rotWithShape="0"/>
+          </a:effectLst>
+        </p:spPr>
+      </p:pic>
+      <p:pic>
+        <p:nvPicPr>
+          <p:cNvPr id="11" name="Picture 10"/>
+          <p:cNvPicPr/>
+          <p:nvPr/>
+        </p:nvPicPr>
+        <p:blipFill>
+          <a:blip r:embed="rId7" cstate="print">
+            <a:extLst>
+              <a:ext uri="{28A0092B-C50C-407E-A947-70E740481C1C}">
+                <a14:useLocalDpi xmlns:a14="http://schemas.microsoft.com/office/drawing/2010/main" val="0"/>
+              </a:ext>
+            </a:extLst>
+          </a:blip>
+          <a:stretch>
+            <a:fillRect/>
+          </a:stretch>
+        </p:blipFill>
+        <p:spPr>
+          <a:xfrm>
+            <a:off x="9661085" y="4219229"/>
+            <a:ext cx="1981200" cy="2055495"/>
+          </a:xfrm>
+          <a:prstGeom prst="roundRect">
+            <a:avLst>
+              <a:gd name="adj" fmla="val 8594"/>
+            </a:avLst>
+          </a:prstGeom>
+          <a:solidFill>
+            <a:srgbClr val="FFFFFF">
+              <a:shade val="85000"/>
+            </a:srgbClr>
+          </a:solidFill>
+          <a:ln>
+            <a:noFill/>
+          </a:ln>
+          <a:effectLst>
+            <a:reflection blurRad="12700" stA="38000" endPos="28000" dist="5000" dir="5400000" sy="-100000" algn="bl" rotWithShape="0"/>
+          </a:effectLst>
         </p:spPr>
       </p:pic>
     </p:spTree>
@@ -5599,7 +7107,7 @@
           <a:p>
             <a:r>
               <a:rPr lang="en-US" dirty="0" smtClean="0"/>
-              <a:t>Level Requirements</a:t>
+              <a:t>Technical Specifications</a:t>
             </a:r>
             <a:endParaRPr lang="en-US" dirty="0"/>
           </a:p>
@@ -5617,9 +7125,7 @@
         </p:nvSpPr>
         <p:spPr/>
         <p:txBody>
-          <a:bodyPr>
-            <a:normAutofit/>
-          </a:bodyPr>
+          <a:bodyPr/>
           <a:lstStyle/>
           <a:p>
             <a:pPr>
@@ -5627,12 +7133,8 @@
               <a:buChar char="o"/>
             </a:pPr>
             <a:r>
-              <a:rPr lang="en-US" sz="2800" dirty="0"/>
-              <a:t> </a:t>
-            </a:r>
-            <a:r>
-              <a:rPr lang="en-US" sz="2800" dirty="0" smtClean="0"/>
-              <a:t>Level Diagram</a:t>
+              <a:rPr lang="en-US" dirty="0" smtClean="0"/>
+              <a:t>Naming Conventions</a:t>
             </a:r>
           </a:p>
           <a:p>
@@ -5641,8 +7143,28 @@
               <a:buChar char="o"/>
             </a:pPr>
             <a:r>
-              <a:rPr lang="en-US" sz="2800" dirty="0" smtClean="0"/>
-              <a:t>Asset Revelation Schedule</a:t>
+              <a:rPr lang="en-US" dirty="0" smtClean="0"/>
+              <a:t>Scripts</a:t>
+            </a:r>
+          </a:p>
+          <a:p>
+            <a:pPr lvl="1">
+              <a:buFont typeface="Courier New" panose="02070309020205020404" pitchFamily="49" charset="0"/>
+              <a:buChar char="o"/>
+            </a:pPr>
+            <a:r>
+              <a:rPr lang="en-US" dirty="0" smtClean="0"/>
+              <a:t>For each Interaction</a:t>
+            </a:r>
+          </a:p>
+          <a:p>
+            <a:pPr lvl="1">
+              <a:buFont typeface="Courier New" panose="02070309020205020404" pitchFamily="49" charset="0"/>
+              <a:buChar char="o"/>
+            </a:pPr>
+            <a:r>
+              <a:rPr lang="en-US" dirty="0" smtClean="0"/>
+              <a:t>Structure</a:t>
             </a:r>
           </a:p>
           <a:p>
@@ -5651,17 +7173,245 @@
               <a:buChar char="o"/>
             </a:pPr>
             <a:r>
-              <a:rPr lang="en-US" sz="2800" dirty="0" smtClean="0"/>
-              <a:t>Level Design Seeds</a:t>
-            </a:r>
-            <a:endParaRPr lang="en-US" sz="2800" dirty="0"/>
-          </a:p>
-        </p:txBody>
-      </p:sp>
+              <a:rPr lang="en-US" dirty="0" smtClean="0"/>
+              <a:t>Game Objects Architecture</a:t>
+            </a:r>
+          </a:p>
+          <a:p>
+            <a:pPr lvl="1">
+              <a:buFont typeface="Courier New" panose="02070309020205020404" pitchFamily="49" charset="0"/>
+              <a:buChar char="o"/>
+            </a:pPr>
+            <a:r>
+              <a:rPr lang="en-US" dirty="0" smtClean="0"/>
+              <a:t>Transform</a:t>
+            </a:r>
+          </a:p>
+          <a:p>
+            <a:pPr lvl="1">
+              <a:buFont typeface="Courier New" panose="02070309020205020404" pitchFamily="49" charset="0"/>
+              <a:buChar char="o"/>
+            </a:pPr>
+            <a:r>
+              <a:rPr lang="en-US" dirty="0" err="1" smtClean="0"/>
+              <a:t>Rigidbody</a:t>
+            </a:r>
+            <a:endParaRPr lang="en-US" dirty="0" smtClean="0"/>
+          </a:p>
+          <a:p>
+            <a:pPr lvl="1">
+              <a:buFont typeface="Courier New" panose="02070309020205020404" pitchFamily="49" charset="0"/>
+              <a:buChar char="o"/>
+            </a:pPr>
+            <a:r>
+              <a:rPr lang="en-US" dirty="0" err="1" smtClean="0"/>
+              <a:t>Colllider</a:t>
+            </a:r>
+            <a:endParaRPr lang="en-US" dirty="0" smtClean="0"/>
+          </a:p>
+          <a:p>
+            <a:pPr lvl="1">
+              <a:buFont typeface="Courier New" panose="02070309020205020404" pitchFamily="49" charset="0"/>
+              <a:buChar char="o"/>
+            </a:pPr>
+            <a:r>
+              <a:rPr lang="en-US" dirty="0" smtClean="0"/>
+              <a:t>Script</a:t>
+            </a:r>
+            <a:endParaRPr lang="en-US" dirty="0"/>
+          </a:p>
+          <a:p>
+            <a:pPr marL="0" indent="0">
+              <a:buNone/>
+            </a:pPr>
+            <a:endParaRPr lang="en-US" dirty="0"/>
+          </a:p>
+        </p:txBody>
+      </p:sp>
+      <p:sp>
+        <p:nvSpPr>
+          <p:cNvPr id="6" name="Rectangle 2"/>
+          <p:cNvSpPr>
+            <a:spLocks noChangeArrowheads="1"/>
+          </p:cNvSpPr>
+          <p:nvPr/>
+        </p:nvSpPr>
+        <p:spPr bwMode="auto">
+          <a:xfrm>
+            <a:off x="5439508" y="1992923"/>
+            <a:ext cx="12192000" cy="0"/>
+          </a:xfrm>
+          <a:prstGeom prst="rect">
+            <a:avLst/>
+          </a:prstGeom>
+          <a:noFill/>
+          <a:ln>
+            <a:noFill/>
+          </a:ln>
+          <a:effectLst/>
+          <a:extLst>
+            <a:ext uri="{909E8E84-426E-40DD-AFC4-6F175D3DCCD1}">
+              <a14:hiddenFill xmlns:a14="http://schemas.microsoft.com/office/drawing/2010/main">
+                <a:solidFill>
+                  <a:schemeClr val="accent1"/>
+                </a:solidFill>
+              </a14:hiddenFill>
+            </a:ext>
+            <a:ext uri="{91240B29-F687-4F45-9708-019B960494DF}">
+              <a14:hiddenLine xmlns:a14="http://schemas.microsoft.com/office/drawing/2010/main" w="9525">
+                <a:solidFill>
+                  <a:schemeClr val="tx1"/>
+                </a:solidFill>
+                <a:miter lim="800000"/>
+                <a:headEnd/>
+                <a:tailEnd/>
+              </a14:hiddenLine>
+            </a:ext>
+            <a:ext uri="{AF507438-7753-43E0-B8FC-AC1667EBCBE1}">
+              <a14:hiddenEffects xmlns:a14="http://schemas.microsoft.com/office/drawing/2010/main">
+                <a:effectLst>
+                  <a:outerShdw dist="35921" dir="2700000" algn="ctr" rotWithShape="0">
+                    <a:schemeClr val="bg2"/>
+                  </a:outerShdw>
+                </a:effectLst>
+              </a14:hiddenEffects>
+            </a:ext>
+          </a:extLst>
+        </p:spPr>
+        <p:txBody>
+          <a:bodyPr vert="horz" wrap="none" lIns="91440" tIns="45720" rIns="91440" bIns="45720" numCol="1" anchor="ctr" anchorCtr="0" compatLnSpc="1">
+            <a:prstTxWarp prst="textNoShape">
+              <a:avLst/>
+            </a:prstTxWarp>
+            <a:spAutoFit/>
+          </a:bodyPr>
+          <a:lstStyle/>
+          <a:p>
+            <a:endParaRPr lang="en-US"/>
+          </a:p>
+        </p:txBody>
+      </p:sp>
+      <p:graphicFrame>
+        <p:nvGraphicFramePr>
+          <p:cNvPr id="7" name="Object 6"/>
+          <p:cNvGraphicFramePr>
+            <a:graphicFrameLocks noChangeAspect="1"/>
+          </p:cNvGraphicFramePr>
+          <p:nvPr>
+            <p:extLst>
+              <p:ext uri="{D42A27DB-BD31-4B8C-83A1-F6EECF244321}">
+                <p14:modId xmlns:p14="http://schemas.microsoft.com/office/powerpoint/2010/main" val="2627467342"/>
+              </p:ext>
+            </p:extLst>
+          </p:nvPr>
+        </p:nvGraphicFramePr>
+        <p:xfrm>
+          <a:off x="5439508" y="1992923"/>
+          <a:ext cx="5419725" cy="3295650"/>
+        </p:xfrm>
+        <a:graphic>
+          <a:graphicData uri="http://schemas.openxmlformats.org/presentationml/2006/ole">
+            <mc:AlternateContent xmlns:mc="http://schemas.openxmlformats.org/markup-compatibility/2006">
+              <mc:Choice xmlns:v="urn:schemas-microsoft-com:vml" Requires="v">
+                <p:oleObj spid="_x0000_s3078" r:id="rId3" imgW="7181902" imgH="4381327" progId="Visio.Drawing.15">
+                  <p:embed/>
+                </p:oleObj>
+              </mc:Choice>
+              <mc:Fallback>
+                <p:oleObj r:id="rId3" imgW="7181902" imgH="4381327" progId="Visio.Drawing.15">
+                  <p:embed/>
+                  <p:pic>
+                    <p:nvPicPr>
+                      <p:cNvPr id="0" name="Object 1"/>
+                      <p:cNvPicPr>
+                        <a:picLocks noChangeAspect="1" noChangeArrowheads="1"/>
+                      </p:cNvPicPr>
+                      <p:nvPr/>
+                    </p:nvPicPr>
+                    <p:blipFill>
+                      <a:blip r:embed="rId4">
+                        <a:extLst>
+                          <a:ext uri="{28A0092B-C50C-407E-A947-70E740481C1C}">
+                            <a14:useLocalDpi xmlns:a14="http://schemas.microsoft.com/office/drawing/2010/main" val="0"/>
+                          </a:ext>
+                        </a:extLst>
+                      </a:blip>
+                      <a:srcRect/>
+                      <a:stretch>
+                        <a:fillRect/>
+                      </a:stretch>
+                    </p:blipFill>
+                    <p:spPr bwMode="auto">
+                      <a:xfrm>
+                        <a:off x="5439508" y="1992923"/>
+                        <a:ext cx="5419725" cy="3295650"/>
+                      </a:xfrm>
+                      <a:prstGeom prst="rect">
+                        <a:avLst/>
+                      </a:prstGeom>
+                      <a:noFill/>
+                      <a:extLst>
+                        <a:ext uri="{909E8E84-426E-40DD-AFC4-6F175D3DCCD1}">
+                          <a14:hiddenFill xmlns:a14="http://schemas.microsoft.com/office/drawing/2010/main">
+                            <a:solidFill>
+                              <a:srgbClr val="FFFFFF"/>
+                            </a:solidFill>
+                          </a14:hiddenFill>
+                        </a:ext>
+                      </a:extLst>
+                    </p:spPr>
+                  </p:pic>
+                </p:oleObj>
+              </mc:Fallback>
+            </mc:AlternateContent>
+          </a:graphicData>
+        </a:graphic>
+      </p:graphicFrame>
+      <p:pic>
+        <p:nvPicPr>
+          <p:cNvPr id="8" name="Picture 7"/>
+          <p:cNvPicPr/>
+          <p:nvPr/>
+        </p:nvPicPr>
+        <p:blipFill>
+          <a:blip r:embed="rId5" cstate="print">
+            <a:extLst>
+              <a:ext uri="{28A0092B-C50C-407E-A947-70E740481C1C}">
+                <a14:useLocalDpi xmlns:a14="http://schemas.microsoft.com/office/drawing/2010/main" val="0"/>
+              </a:ext>
+            </a:extLst>
+          </a:blip>
+          <a:stretch>
+            <a:fillRect/>
+          </a:stretch>
+        </p:blipFill>
+        <p:spPr>
+          <a:xfrm>
+            <a:off x="7513710" y="78227"/>
+            <a:ext cx="3641970" cy="1639726"/>
+          </a:xfrm>
+          <a:prstGeom prst="roundRect">
+            <a:avLst>
+              <a:gd name="adj" fmla="val 8594"/>
+            </a:avLst>
+          </a:prstGeom>
+          <a:solidFill>
+            <a:srgbClr val="FFFFFF">
+              <a:shade val="85000"/>
+            </a:srgbClr>
+          </a:solidFill>
+          <a:ln>
+            <a:noFill/>
+          </a:ln>
+          <a:effectLst>
+            <a:reflection blurRad="12700" stA="38000" endPos="28000" dist="5000" dir="5400000" sy="-100000" algn="bl" rotWithShape="0"/>
+          </a:effectLst>
+        </p:spPr>
+      </p:pic>
     </p:spTree>
     <p:extLst>
       <p:ext uri="{BB962C8B-B14F-4D97-AF65-F5344CB8AC3E}">
-        <p14:creationId xmlns:p14="http://schemas.microsoft.com/office/powerpoint/2010/main" val="3059164976"/>
+        <p14:creationId xmlns:p14="http://schemas.microsoft.com/office/powerpoint/2010/main" val="2886218978"/>
       </p:ext>
     </p:extLst>
   </p:cSld>

</xml_diff>

<commit_message>
updated mockups for design documents
</commit_message>
<xml_diff>
--- a/Documentation/Design Document/UnityDesignPresentation.pptx
+++ b/Documentation/Design Document/UnityDesignPresentation.pptx
@@ -4283,7 +4283,7 @@
           <a:graphicData uri="http://schemas.openxmlformats.org/presentationml/2006/ole">
             <mc:AlternateContent xmlns:mc="http://schemas.openxmlformats.org/markup-compatibility/2006">
               <mc:Choice xmlns:v="urn:schemas-microsoft-com:vml" Requires="v">
-                <p:oleObj spid="_x0000_s2061" r:id="rId3" imgW="9401254" imgH="7181837" progId="Visio.Drawing.15">
+                <p:oleObj spid="_x0000_s2063" r:id="rId3" imgW="9401254" imgH="7181837" progId="Visio.Drawing.15">
                   <p:embed/>
                 </p:oleObj>
               </mc:Choice>
@@ -4698,20 +4698,20 @@
           <p:nvPr>
             <p:extLst>
               <p:ext uri="{D42A27DB-BD31-4B8C-83A1-F6EECF244321}">
-                <p14:modId xmlns:p14="http://schemas.microsoft.com/office/powerpoint/2010/main" val="2627467342"/>
+                <p14:modId xmlns:p14="http://schemas.microsoft.com/office/powerpoint/2010/main" val="1255095375"/>
               </p:ext>
             </p:extLst>
           </p:nvPr>
         </p:nvGraphicFramePr>
         <p:xfrm>
-          <a:off x="5439508" y="1992923"/>
+          <a:off x="5439508" y="2012587"/>
           <a:ext cx="5419725" cy="3295650"/>
         </p:xfrm>
         <a:graphic>
           <a:graphicData uri="http://schemas.openxmlformats.org/presentationml/2006/ole">
             <mc:AlternateContent xmlns:mc="http://schemas.openxmlformats.org/markup-compatibility/2006">
               <mc:Choice xmlns:v="urn:schemas-microsoft-com:vml" Requires="v">
-                <p:oleObj spid="_x0000_s3084" r:id="rId3" imgW="7181902" imgH="4381327" progId="Visio.Drawing.15">
+                <p:oleObj spid="_x0000_s3086" r:id="rId3" imgW="7181902" imgH="4381327" progId="Visio.Drawing.15">
                   <p:embed/>
                 </p:oleObj>
               </mc:Choice>
@@ -4741,7 +4741,7 @@
                     </p:blipFill>
                     <p:spPr bwMode="auto">
                       <a:xfrm>
-                        <a:off x="5439508" y="1992923"/>
+                        <a:off x="5439508" y="2012587"/>
                         <a:ext cx="5419725" cy="3295650"/>
                       </a:xfrm>
                       <a:prstGeom prst="rect">
@@ -5040,7 +5040,7 @@
           <a:graphicData uri="http://schemas.openxmlformats.org/presentationml/2006/ole">
             <mc:AlternateContent xmlns:mc="http://schemas.openxmlformats.org/markup-compatibility/2006">
               <mc:Choice xmlns:v="urn:schemas-microsoft-com:vml" Requires="v">
-                <p:oleObj spid="_x0000_s4108" r:id="rId3" imgW="5848208" imgH="3009847" progId="Visio.Drawing.15">
+                <p:oleObj spid="_x0000_s4110" r:id="rId3" imgW="5848208" imgH="3009847" progId="Visio.Drawing.15">
                   <p:embed/>
                 </p:oleObj>
               </mc:Choice>
@@ -5477,7 +5477,7 @@
           <a:graphicData uri="http://schemas.openxmlformats.org/presentationml/2006/ole">
             <mc:AlternateContent xmlns:mc="http://schemas.openxmlformats.org/markup-compatibility/2006">
               <mc:Choice xmlns:v="urn:schemas-microsoft-com:vml" Requires="v">
-                <p:oleObj spid="_x0000_s5132" r:id="rId3" imgW="6667590" imgH="4419508" progId="Visio.Drawing.15">
+                <p:oleObj spid="_x0000_s5134" r:id="rId3" imgW="6667590" imgH="4419508" progId="Visio.Drawing.15">
                   <p:embed/>
                 </p:oleObj>
               </mc:Choice>
@@ -6180,42 +6180,50 @@
       </p:sp>
       <p:pic>
         <p:nvPicPr>
-          <p:cNvPr id="5" name="Picture 4"/>
-          <p:cNvPicPr/>
+          <p:cNvPr id="6" name="Picture 5"/>
+          <p:cNvPicPr>
+            <a:picLocks noChangeAspect="1"/>
+          </p:cNvPicPr>
           <p:nvPr/>
         </p:nvPicPr>
-        <p:blipFill rotWithShape="1">
-          <a:blip r:embed="rId2" cstate="print">
+        <p:blipFill>
+          <a:blip r:embed="rId2">
             <a:extLst>
               <a:ext uri="{28A0092B-C50C-407E-A947-70E740481C1C}">
                 <a14:useLocalDpi xmlns:a14="http://schemas.microsoft.com/office/drawing/2010/main" val="0"/>
               </a:ext>
             </a:extLst>
           </a:blip>
-          <a:srcRect l="481" t="12250" r="21795" b="21938"/>
-          <a:stretch/>
+          <a:stretch>
+            <a:fillRect/>
+          </a:stretch>
         </p:blipFill>
-        <p:spPr bwMode="auto">
-          <a:xfrm>
-            <a:off x="4044876" y="2008709"/>
-            <a:ext cx="7110804" cy="3697410"/>
-          </a:xfrm>
-          <a:prstGeom prst="rect">
-            <a:avLst/>
+        <p:spPr>
+          <a:xfrm>
+            <a:off x="9181129" y="0"/>
+            <a:ext cx="1245512" cy="1721852"/>
+          </a:xfrm>
+          <a:prstGeom prst="roundRect">
+            <a:avLst>
+              <a:gd name="adj" fmla="val 8594"/>
+            </a:avLst>
           </a:prstGeom>
+          <a:solidFill>
+            <a:srgbClr val="FFFFFF">
+              <a:shade val="85000"/>
+            </a:srgbClr>
+          </a:solidFill>
           <a:ln>
             <a:noFill/>
           </a:ln>
-          <a:extLst>
-            <a:ext uri="{53640926-AAD7-44D8-BBD7-CCE9431645EC}">
-              <a14:shadowObscured xmlns:a14="http://schemas.microsoft.com/office/drawing/2010/main"/>
-            </a:ext>
-          </a:extLst>
+          <a:effectLst>
+            <a:reflection blurRad="12700" stA="38000" endPos="28000" dist="5000" dir="5400000" sy="-100000" algn="bl" rotWithShape="0"/>
+          </a:effectLst>
         </p:spPr>
       </p:pic>
       <p:pic>
         <p:nvPicPr>
-          <p:cNvPr id="6" name="Picture 5"/>
+          <p:cNvPr id="7" name="Picture 6"/>
           <p:cNvPicPr>
             <a:picLocks noChangeAspect="1"/>
           </p:cNvPicPr>
@@ -6235,25 +6243,12 @@
         </p:blipFill>
         <p:spPr>
           <a:xfrm>
-            <a:off x="9181129" y="0"/>
-            <a:ext cx="1245512" cy="1721852"/>
-          </a:xfrm>
-          <a:prstGeom prst="roundRect">
-            <a:avLst>
-              <a:gd name="adj" fmla="val 8594"/>
-            </a:avLst>
+            <a:off x="3622766" y="1906881"/>
+            <a:ext cx="7181850" cy="3962213"/>
+          </a:xfrm>
+          <a:prstGeom prst="rect">
+            <a:avLst/>
           </a:prstGeom>
-          <a:solidFill>
-            <a:srgbClr val="FFFFFF">
-              <a:shade val="85000"/>
-            </a:srgbClr>
-          </a:solidFill>
-          <a:ln>
-            <a:noFill/>
-          </a:ln>
-          <a:effectLst>
-            <a:reflection blurRad="12700" stA="38000" endPos="28000" dist="5000" dir="5400000" sy="-100000" algn="bl" rotWithShape="0"/>
-          </a:effectLst>
         </p:spPr>
       </p:pic>
     </p:spTree>
@@ -6356,7 +6351,7 @@
             </a:pPr>
             <a:r>
               <a:rPr lang="en-US" sz="2800" dirty="0" smtClean="0"/>
-              <a:t>Represent Wayne State</a:t>
+              <a:t>Simple</a:t>
             </a:r>
           </a:p>
           <a:p>
@@ -6366,17 +6361,11 @@
             </a:pPr>
             <a:r>
               <a:rPr lang="en-US" sz="2800" dirty="0" smtClean="0"/>
-              <a:t>Simple</a:t>
-            </a:r>
-          </a:p>
-          <a:p>
-            <a:pPr marL="285750" indent="-285750">
-              <a:buFont typeface="Wingdings" panose="05000000000000000000" pitchFamily="2" charset="2"/>
-              <a:buChar char="q"/>
-            </a:pPr>
+              <a:t>Intuitive </a:t>
+            </a:r>
             <a:r>
               <a:rPr lang="en-US" sz="2800" dirty="0" smtClean="0"/>
-              <a:t>Intuitive Navigation</a:t>
+              <a:t>Navigation</a:t>
             </a:r>
             <a:endParaRPr lang="en-US" sz="2800" dirty="0"/>
           </a:p>
@@ -6467,7 +6456,7 @@
           <a:graphicData uri="http://schemas.openxmlformats.org/presentationml/2006/ole">
             <mc:AlternateContent xmlns:mc="http://schemas.openxmlformats.org/markup-compatibility/2006">
               <mc:Choice xmlns:v="urn:schemas-microsoft-com:vml" Requires="v">
-                <p:oleObj spid="_x0000_s1040" r:id="rId3" imgW="6639011" imgH="6105658" progId="Visio.Drawing.15">
+                <p:oleObj spid="_x0000_s1042" r:id="rId3" imgW="6639011" imgH="6105658" progId="Visio.Drawing.15">
                   <p:embed/>
                 </p:oleObj>
               </mc:Choice>
@@ -7378,7 +7367,7 @@
           <a:graphicData uri="http://schemas.openxmlformats.org/presentationml/2006/ole">
             <mc:AlternateContent xmlns:mc="http://schemas.openxmlformats.org/markup-compatibility/2006">
               <mc:Choice xmlns:v="urn:schemas-microsoft-com:vml" Requires="v">
-                <p:oleObj spid="_x0000_s7171" r:id="rId3" imgW="8886746" imgH="6800930" progId="Visio.Drawing.15">
+                <p:oleObj spid="_x0000_s7173" r:id="rId3" imgW="8886746" imgH="6800930" progId="Visio.Drawing.15">
                   <p:embed/>
                 </p:oleObj>
               </mc:Choice>

</xml_diff>

<commit_message>
Updating presentation to include updated sequence diagram
</commit_message>
<xml_diff>
--- a/Documentation/Design Document/UnityDesignPresentation.pptx
+++ b/Documentation/Design Document/UnityDesignPresentation.pptx
@@ -221,7 +221,7 @@
           <a:p>
             <a:fld id="{36F12CB1-DABA-4CBD-967D-6A1DEAF14A26}" type="datetimeFigureOut">
               <a:rPr lang="en-US" smtClean="0"/>
-              <a:t>3/10/2015</a:t>
+              <a:t>3/12/2015</a:t>
             </a:fld>
             <a:endParaRPr lang="en-US"/>
           </a:p>
@@ -530,7 +530,7 @@
           <a:p>
             <a:fld id="{4BDF68E2-58F2-4D09-BE8B-E3BD06533059}" type="datetimeFigureOut">
               <a:rPr lang="en-US" dirty="0"/>
-              <a:t>3/10/2015</a:t>
+              <a:t>3/12/2015</a:t>
             </a:fld>
             <a:endParaRPr lang="en-US" dirty="0"/>
           </a:p>
@@ -733,7 +733,7 @@
           <a:p>
             <a:fld id="{2E2D6473-DF6D-4702-B328-E0DD40540A4E}" type="datetimeFigureOut">
               <a:rPr lang="en-US" dirty="0"/>
-              <a:t>3/10/2015</a:t>
+              <a:t>3/12/2015</a:t>
             </a:fld>
             <a:endParaRPr lang="en-US" dirty="0"/>
           </a:p>
@@ -984,7 +984,7 @@
           <a:p>
             <a:fld id="{E26F7E3A-B166-407D-9866-32884E7D5B37}" type="datetimeFigureOut">
               <a:rPr lang="en-US" dirty="0"/>
-              <a:t>3/10/2015</a:t>
+              <a:t>3/12/2015</a:t>
             </a:fld>
             <a:endParaRPr lang="en-US" dirty="0"/>
           </a:p>
@@ -1153,7 +1153,7 @@
           <a:p>
             <a:fld id="{528FC5F6-F338-4AE4-BB23-26385BCFC423}" type="datetimeFigureOut">
               <a:rPr lang="en-US" dirty="0"/>
-              <a:t>3/10/2015</a:t>
+              <a:t>3/12/2015</a:t>
             </a:fld>
             <a:endParaRPr lang="en-US" dirty="0"/>
           </a:p>
@@ -1491,7 +1491,7 @@
           <a:p>
             <a:fld id="{20EBB0C4-6273-4C6E-B9BD-2EDC30F1CD52}" type="datetimeFigureOut">
               <a:rPr lang="en-US" dirty="0"/>
-              <a:t>3/10/2015</a:t>
+              <a:t>3/12/2015</a:t>
             </a:fld>
             <a:endParaRPr lang="en-US" dirty="0"/>
           </a:p>
@@ -1761,7 +1761,7 @@
           <a:p>
             <a:fld id="{19AB4D41-86C1-4908-B66A-0B50CEB3BF29}" type="datetimeFigureOut">
               <a:rPr lang="en-US" dirty="0"/>
-              <a:t>3/10/2015</a:t>
+              <a:t>3/12/2015</a:t>
             </a:fld>
             <a:endParaRPr lang="en-US" dirty="0"/>
           </a:p>
@@ -2135,7 +2135,7 @@
           <a:p>
             <a:fld id="{E6426E2C-56C1-4E0D-A793-0088A7FDD37E}" type="datetimeFigureOut">
               <a:rPr lang="en-US" dirty="0"/>
-              <a:t>3/10/2015</a:t>
+              <a:t>3/12/2015</a:t>
             </a:fld>
             <a:endParaRPr lang="en-US" dirty="0"/>
           </a:p>
@@ -2248,7 +2248,7 @@
           <a:p>
             <a:fld id="{C8C39B41-D8B5-4052-B551-9B5525EAA8B6}" type="datetimeFigureOut">
               <a:rPr lang="en-US" dirty="0"/>
-              <a:t>3/10/2015</a:t>
+              <a:t>3/12/2015</a:t>
             </a:fld>
             <a:endParaRPr lang="en-US" dirty="0"/>
           </a:p>
@@ -2414,7 +2414,7 @@
           <a:p>
             <a:fld id="{4D94136C-8742-45B2-AF27-D93DF72833A9}" type="datetimeFigureOut">
               <a:rPr lang="en-US" dirty="0"/>
-              <a:t>3/10/2015</a:t>
+              <a:t>3/12/2015</a:t>
             </a:fld>
             <a:endParaRPr lang="en-US" dirty="0"/>
           </a:p>
@@ -2764,7 +2764,7 @@
           <a:p>
             <a:fld id="{32ABBEA6-7C60-4B02-AE87-00D78D8422AF}" type="datetimeFigureOut">
               <a:rPr lang="en-US" dirty="0"/>
-              <a:t>3/10/2015</a:t>
+              <a:t>3/12/2015</a:t>
             </a:fld>
             <a:endParaRPr lang="en-US" dirty="0"/>
           </a:p>
@@ -3142,7 +3142,7 @@
           <a:p>
             <a:fld id="{C9CAD897-D46E-4AD2-BD9B-49DD3E640873}" type="datetimeFigureOut">
               <a:rPr lang="en-US" dirty="0"/>
-              <a:t>3/10/2015</a:t>
+              <a:t>3/12/2015</a:t>
             </a:fld>
             <a:endParaRPr lang="en-US" dirty="0"/>
           </a:p>
@@ -3424,7 +3424,7 @@
           <a:p>
             <a:fld id="{98624D31-43A5-475A-80CF-332C9F6DCF35}" type="datetimeFigureOut">
               <a:rPr lang="en-US" dirty="0"/>
-              <a:t>3/10/2015</a:t>
+              <a:t>3/12/2015</a:t>
             </a:fld>
             <a:endParaRPr lang="en-US" dirty="0"/>
           </a:p>
@@ -4283,12 +4283,12 @@
           <a:graphicData uri="http://schemas.openxmlformats.org/presentationml/2006/ole">
             <mc:AlternateContent xmlns:mc="http://schemas.openxmlformats.org/markup-compatibility/2006">
               <mc:Choice xmlns:v="urn:schemas-microsoft-com:vml" Requires="v">
-                <p:oleObj spid="_x0000_s2063" r:id="rId3" imgW="9401254" imgH="7181837" progId="Visio.Drawing.15">
+                <p:oleObj spid="_x0000_s2064" r:id="rId4" imgW="9401254" imgH="7181837" progId="Visio.Drawing.15">
                   <p:embed/>
                 </p:oleObj>
               </mc:Choice>
               <mc:Fallback>
-                <p:oleObj r:id="rId3" imgW="9401254" imgH="7181837" progId="Visio.Drawing.15">
+                <p:oleObj r:id="rId4" imgW="9401254" imgH="7181837" progId="Visio.Drawing.15">
                   <p:embed/>
                   <p:pic>
                     <p:nvPicPr>
@@ -4299,7 +4299,7 @@
                       <p:nvPr/>
                     </p:nvPicPr>
                     <p:blipFill>
-                      <a:blip r:embed="rId4">
+                      <a:blip r:embed="rId5">
                         <a:extLst>
                           <a:ext uri="{28A0092B-C50C-407E-A947-70E740481C1C}">
                             <a14:useLocalDpi xmlns:a14="http://schemas.microsoft.com/office/drawing/2010/main" val="0"/>
@@ -4335,7 +4335,7 @@
           <p:nvPr/>
         </p:nvPicPr>
         <p:blipFill>
-          <a:blip r:embed="rId5" cstate="print">
+          <a:blip r:embed="rId6" cstate="print">
             <a:extLst>
               <a:ext uri="{28A0092B-C50C-407E-A947-70E740481C1C}">
                 <a14:useLocalDpi xmlns:a14="http://schemas.microsoft.com/office/drawing/2010/main" val="0"/>
@@ -4376,7 +4376,7 @@
           <p:nvPr/>
         </p:nvPicPr>
         <p:blipFill>
-          <a:blip r:embed="rId6" cstate="print">
+          <a:blip r:embed="rId7" cstate="print">
             <a:extLst>
               <a:ext uri="{28A0092B-C50C-407E-A947-70E740481C1C}">
                 <a14:useLocalDpi xmlns:a14="http://schemas.microsoft.com/office/drawing/2010/main" val="0"/>
@@ -4417,7 +4417,7 @@
           <p:nvPr/>
         </p:nvPicPr>
         <p:blipFill>
-          <a:blip r:embed="rId7" cstate="print">
+          <a:blip r:embed="rId8" cstate="print">
             <a:extLst>
               <a:ext uri="{28A0092B-C50C-407E-A947-70E740481C1C}">
                 <a14:useLocalDpi xmlns:a14="http://schemas.microsoft.com/office/drawing/2010/main" val="0"/>
@@ -4711,12 +4711,12 @@
           <a:graphicData uri="http://schemas.openxmlformats.org/presentationml/2006/ole">
             <mc:AlternateContent xmlns:mc="http://schemas.openxmlformats.org/markup-compatibility/2006">
               <mc:Choice xmlns:v="urn:schemas-microsoft-com:vml" Requires="v">
-                <p:oleObj spid="_x0000_s3086" r:id="rId3" imgW="7181902" imgH="4381327" progId="Visio.Drawing.15">
+                <p:oleObj spid="_x0000_s3087" r:id="rId4" imgW="7181902" imgH="4381327" progId="Visio.Drawing.15">
                   <p:embed/>
                 </p:oleObj>
               </mc:Choice>
               <mc:Fallback>
-                <p:oleObj r:id="rId3" imgW="7181902" imgH="4381327" progId="Visio.Drawing.15">
+                <p:oleObj r:id="rId4" imgW="7181902" imgH="4381327" progId="Visio.Drawing.15">
                   <p:embed/>
                   <p:pic>
                     <p:nvPicPr>
@@ -4727,7 +4727,7 @@
                       <p:nvPr/>
                     </p:nvPicPr>
                     <p:blipFill>
-                      <a:blip r:embed="rId4">
+                      <a:blip r:embed="rId5">
                         <a:extLst>
                           <a:ext uri="{28A0092B-C50C-407E-A947-70E740481C1C}">
                             <a14:useLocalDpi xmlns:a14="http://schemas.microsoft.com/office/drawing/2010/main" val="0"/>
@@ -4772,7 +4772,7 @@
           <p:nvPr/>
         </p:nvPicPr>
         <p:blipFill>
-          <a:blip r:embed="rId5" cstate="print">
+          <a:blip r:embed="rId6" cstate="print">
             <a:extLst>
               <a:ext uri="{28A0092B-C50C-407E-A947-70E740481C1C}">
                 <a14:useLocalDpi xmlns:a14="http://schemas.microsoft.com/office/drawing/2010/main" val="0"/>
@@ -5040,12 +5040,12 @@
           <a:graphicData uri="http://schemas.openxmlformats.org/presentationml/2006/ole">
             <mc:AlternateContent xmlns:mc="http://schemas.openxmlformats.org/markup-compatibility/2006">
               <mc:Choice xmlns:v="urn:schemas-microsoft-com:vml" Requires="v">
-                <p:oleObj spid="_x0000_s4110" r:id="rId3" imgW="5848208" imgH="3009847" progId="Visio.Drawing.15">
+                <p:oleObj spid="_x0000_s4111" r:id="rId4" imgW="5848208" imgH="3009847" progId="Visio.Drawing.15">
                   <p:embed/>
                 </p:oleObj>
               </mc:Choice>
               <mc:Fallback>
-                <p:oleObj r:id="rId3" imgW="5848208" imgH="3009847" progId="Visio.Drawing.15">
+                <p:oleObj r:id="rId4" imgW="5848208" imgH="3009847" progId="Visio.Drawing.15">
                   <p:embed/>
                   <p:pic>
                     <p:nvPicPr>
@@ -5056,7 +5056,7 @@
                       <p:nvPr/>
                     </p:nvPicPr>
                     <p:blipFill>
-                      <a:blip r:embed="rId4">
+                      <a:blip r:embed="rId5">
                         <a:extLst>
                           <a:ext uri="{28A0092B-C50C-407E-A947-70E740481C1C}">
                             <a14:useLocalDpi xmlns:a14="http://schemas.microsoft.com/office/drawing/2010/main" val="0"/>
@@ -5094,7 +5094,7 @@
           <p:nvPr/>
         </p:nvPicPr>
         <p:blipFill>
-          <a:blip r:embed="rId5">
+          <a:blip r:embed="rId6">
             <a:extLst>
               <a:ext uri="{28A0092B-C50C-407E-A947-70E740481C1C}">
                 <a14:useLocalDpi xmlns:a14="http://schemas.microsoft.com/office/drawing/2010/main" val="0"/>
@@ -5165,6 +5165,29 @@
           <a:chExt cx="0" cy="0"/>
         </a:xfrm>
       </p:grpSpPr>
+      <p:pic>
+        <p:nvPicPr>
+          <p:cNvPr id="4" name="Picture 3"/>
+          <p:cNvPicPr>
+            <a:picLocks noChangeAspect="1"/>
+          </p:cNvPicPr>
+          <p:nvPr/>
+        </p:nvPicPr>
+        <p:blipFill rotWithShape="1">
+          <a:blip r:embed="rId2"/>
+          <a:srcRect l="497"/>
+          <a:stretch/>
+        </p:blipFill>
+        <p:spPr>
+          <a:xfrm>
+            <a:off x="5021177" y="1063374"/>
+            <a:ext cx="6920917" cy="5452083"/>
+          </a:xfrm>
+          <a:prstGeom prst="rect">
+            <a:avLst/>
+          </a:prstGeom>
+        </p:spPr>
+      </p:pic>
       <p:sp>
         <p:nvSpPr>
           <p:cNvPr id="2" name="Title 1"/>
@@ -5455,73 +5478,6 @@
           </a:p>
         </p:txBody>
       </p:sp>
-      <p:graphicFrame>
-        <p:nvGraphicFramePr>
-          <p:cNvPr id="5" name="Object 4"/>
-          <p:cNvGraphicFramePr>
-            <a:graphicFrameLocks noChangeAspect="1"/>
-          </p:cNvGraphicFramePr>
-          <p:nvPr>
-            <p:extLst>
-              <p:ext uri="{D42A27DB-BD31-4B8C-83A1-F6EECF244321}">
-                <p14:modId xmlns:p14="http://schemas.microsoft.com/office/powerpoint/2010/main" val="4279879873"/>
-              </p:ext>
-            </p:extLst>
-          </p:nvPr>
-        </p:nvGraphicFramePr>
-        <p:xfrm>
-          <a:off x="4225861" y="779276"/>
-          <a:ext cx="7687871" cy="5084114"/>
-        </p:xfrm>
-        <a:graphic>
-          <a:graphicData uri="http://schemas.openxmlformats.org/presentationml/2006/ole">
-            <mc:AlternateContent xmlns:mc="http://schemas.openxmlformats.org/markup-compatibility/2006">
-              <mc:Choice xmlns:v="urn:schemas-microsoft-com:vml" Requires="v">
-                <p:oleObj spid="_x0000_s5134" r:id="rId3" imgW="6667590" imgH="4419508" progId="Visio.Drawing.15">
-                  <p:embed/>
-                </p:oleObj>
-              </mc:Choice>
-              <mc:Fallback>
-                <p:oleObj r:id="rId3" imgW="6667590" imgH="4419508" progId="Visio.Drawing.15">
-                  <p:embed/>
-                  <p:pic>
-                    <p:nvPicPr>
-                      <p:cNvPr id="0" name="Object 1"/>
-                      <p:cNvPicPr>
-                        <a:picLocks noChangeAspect="1" noChangeArrowheads="1"/>
-                      </p:cNvPicPr>
-                      <p:nvPr/>
-                    </p:nvPicPr>
-                    <p:blipFill>
-                      <a:blip r:embed="rId4">
-                        <a:extLst>
-                          <a:ext uri="{28A0092B-C50C-407E-A947-70E740481C1C}">
-                            <a14:useLocalDpi xmlns:a14="http://schemas.microsoft.com/office/drawing/2010/main" val="0"/>
-                          </a:ext>
-                        </a:extLst>
-                      </a:blip>
-                      <a:srcRect/>
-                      <a:stretch>
-                        <a:fillRect/>
-                      </a:stretch>
-                    </p:blipFill>
-                    <p:spPr bwMode="auto">
-                      <a:xfrm>
-                        <a:off x="4225861" y="779276"/>
-                        <a:ext cx="7687871" cy="5084114"/>
-                      </a:xfrm>
-                      <a:prstGeom prst="rect">
-                        <a:avLst/>
-                      </a:prstGeom>
-                      <a:noFill/>
-                    </p:spPr>
-                  </p:pic>
-                </p:oleObj>
-              </mc:Fallback>
-            </mc:AlternateContent>
-          </a:graphicData>
-        </a:graphic>
-      </p:graphicFrame>
       <p:pic>
         <p:nvPicPr>
           <p:cNvPr id="7" name="Picture 6"/>
@@ -5531,7 +5487,7 @@
           <p:nvPr/>
         </p:nvPicPr>
         <p:blipFill>
-          <a:blip r:embed="rId5">
+          <a:blip r:embed="rId3">
             <a:extLst>
               <a:ext uri="{28A0092B-C50C-407E-A947-70E740481C1C}">
                 <a14:useLocalDpi xmlns:a14="http://schemas.microsoft.com/office/drawing/2010/main" val="0"/>
@@ -6361,11 +6317,7 @@
             </a:pPr>
             <a:r>
               <a:rPr lang="en-US" sz="2800" dirty="0" smtClean="0"/>
-              <a:t>Intuitive </a:t>
-            </a:r>
-            <a:r>
-              <a:rPr lang="en-US" sz="2800" dirty="0" smtClean="0"/>
-              <a:t>Navigation</a:t>
+              <a:t>Intuitive Navigation</a:t>
             </a:r>
             <a:endParaRPr lang="en-US" sz="2800" dirty="0"/>
           </a:p>
@@ -6456,12 +6408,12 @@
           <a:graphicData uri="http://schemas.openxmlformats.org/presentationml/2006/ole">
             <mc:AlternateContent xmlns:mc="http://schemas.openxmlformats.org/markup-compatibility/2006">
               <mc:Choice xmlns:v="urn:schemas-microsoft-com:vml" Requires="v">
-                <p:oleObj spid="_x0000_s1042" r:id="rId3" imgW="6639011" imgH="6105658" progId="Visio.Drawing.15">
+                <p:oleObj spid="_x0000_s1043" r:id="rId4" imgW="6639011" imgH="6105658" progId="Visio.Drawing.15">
                   <p:embed/>
                 </p:oleObj>
               </mc:Choice>
               <mc:Fallback>
-                <p:oleObj r:id="rId3" imgW="6639011" imgH="6105658" progId="Visio.Drawing.15">
+                <p:oleObj r:id="rId4" imgW="6639011" imgH="6105658" progId="Visio.Drawing.15">
                   <p:embed/>
                   <p:pic>
                     <p:nvPicPr>
@@ -6472,7 +6424,7 @@
                       <p:nvPr/>
                     </p:nvPicPr>
                     <p:blipFill>
-                      <a:blip r:embed="rId4">
+                      <a:blip r:embed="rId5">
                         <a:extLst>
                           <a:ext uri="{28A0092B-C50C-407E-A947-70E740481C1C}">
                             <a14:useLocalDpi xmlns:a14="http://schemas.microsoft.com/office/drawing/2010/main" val="0"/>
@@ -6510,7 +6462,7 @@
           <p:nvPr/>
         </p:nvPicPr>
         <p:blipFill>
-          <a:blip r:embed="rId5">
+          <a:blip r:embed="rId6">
             <a:extLst>
               <a:ext uri="{28A0092B-C50C-407E-A947-70E740481C1C}">
                 <a14:useLocalDpi xmlns:a14="http://schemas.microsoft.com/office/drawing/2010/main" val="0"/>
@@ -7367,12 +7319,12 @@
           <a:graphicData uri="http://schemas.openxmlformats.org/presentationml/2006/ole">
             <mc:AlternateContent xmlns:mc="http://schemas.openxmlformats.org/markup-compatibility/2006">
               <mc:Choice xmlns:v="urn:schemas-microsoft-com:vml" Requires="v">
-                <p:oleObj spid="_x0000_s7173" r:id="rId3" imgW="8886746" imgH="6800930" progId="Visio.Drawing.15">
+                <p:oleObj spid="_x0000_s7174" r:id="rId4" imgW="8886746" imgH="6800930" progId="Visio.Drawing.15">
                   <p:embed/>
                 </p:oleObj>
               </mc:Choice>
               <mc:Fallback>
-                <p:oleObj r:id="rId3" imgW="8886746" imgH="6800930" progId="Visio.Drawing.15">
+                <p:oleObj r:id="rId4" imgW="8886746" imgH="6800930" progId="Visio.Drawing.15">
                   <p:embed/>
                   <p:pic>
                     <p:nvPicPr>
@@ -7383,7 +7335,7 @@
                       <p:nvPr/>
                     </p:nvPicPr>
                     <p:blipFill>
-                      <a:blip r:embed="rId4">
+                      <a:blip r:embed="rId5">
                         <a:extLst>
                           <a:ext uri="{28A0092B-C50C-407E-A947-70E740481C1C}">
                             <a14:useLocalDpi xmlns:a14="http://schemas.microsoft.com/office/drawing/2010/main" val="0"/>
@@ -7421,36 +7373,6 @@
           <p:nvPr/>
         </p:nvPicPr>
         <p:blipFill>
-          <a:blip r:embed="rId5">
-            <a:extLst>
-              <a:ext uri="{28A0092B-C50C-407E-A947-70E740481C1C}">
-                <a14:useLocalDpi xmlns:a14="http://schemas.microsoft.com/office/drawing/2010/main" val="0"/>
-              </a:ext>
-            </a:extLst>
-          </a:blip>
-          <a:stretch>
-            <a:fillRect/>
-          </a:stretch>
-        </p:blipFill>
-        <p:spPr>
-          <a:xfrm>
-            <a:off x="5441133" y="1159567"/>
-            <a:ext cx="645035" cy="912385"/>
-          </a:xfrm>
-          <a:prstGeom prst="rect">
-            <a:avLst/>
-          </a:prstGeom>
-        </p:spPr>
-      </p:pic>
-      <p:pic>
-        <p:nvPicPr>
-          <p:cNvPr id="7" name="Picture 6"/>
-          <p:cNvPicPr>
-            <a:picLocks noChangeAspect="1"/>
-          </p:cNvPicPr>
-          <p:nvPr/>
-        </p:nvPicPr>
-        <p:blipFill>
           <a:blip r:embed="rId6">
             <a:extLst>
               <a:ext uri="{28A0092B-C50C-407E-A947-70E740481C1C}">
@@ -7464,6 +7386,36 @@
         </p:blipFill>
         <p:spPr>
           <a:xfrm>
+            <a:off x="5441133" y="1159567"/>
+            <a:ext cx="645035" cy="912385"/>
+          </a:xfrm>
+          <a:prstGeom prst="rect">
+            <a:avLst/>
+          </a:prstGeom>
+        </p:spPr>
+      </p:pic>
+      <p:pic>
+        <p:nvPicPr>
+          <p:cNvPr id="7" name="Picture 6"/>
+          <p:cNvPicPr>
+            <a:picLocks noChangeAspect="1"/>
+          </p:cNvPicPr>
+          <p:nvPr/>
+        </p:nvPicPr>
+        <p:blipFill>
+          <a:blip r:embed="rId7">
+            <a:extLst>
+              <a:ext uri="{28A0092B-C50C-407E-A947-70E740481C1C}">
+                <a14:useLocalDpi xmlns:a14="http://schemas.microsoft.com/office/drawing/2010/main" val="0"/>
+              </a:ext>
+            </a:extLst>
+          </a:blip>
+          <a:stretch>
+            <a:fillRect/>
+          </a:stretch>
+        </p:blipFill>
+        <p:spPr>
+          <a:xfrm>
             <a:off x="7656972" y="3700710"/>
             <a:ext cx="710280" cy="854112"/>
           </a:xfrm>
@@ -7481,7 +7433,7 @@
           <p:nvPr/>
         </p:nvPicPr>
         <p:blipFill>
-          <a:blip r:embed="rId7">
+          <a:blip r:embed="rId8">
             <a:extLst>
               <a:ext uri="{28A0092B-C50C-407E-A947-70E740481C1C}">
                 <a14:useLocalDpi xmlns:a14="http://schemas.microsoft.com/office/drawing/2010/main" val="0"/>

</xml_diff>

<commit_message>
Small change to Menu Flow Diagram. Updated Doc with new Menu Flow Diagram changes. Updated PPT to have new Software Architecture slide as well as some size changes to make diagrams more clear for presentation.
</commit_message>
<xml_diff>
--- a/Documentation/Design Document/UnityDesignPresentation.pptx
+++ b/Documentation/Design Document/UnityDesignPresentation.pptx
@@ -5,7 +5,7 @@
     <p:sldMasterId id="2147483648" r:id="rId1"/>
   </p:sldMasterIdLst>
   <p:handoutMasterIdLst>
-    <p:handoutMasterId r:id="rId15"/>
+    <p:handoutMasterId r:id="rId16"/>
   </p:handoutMasterIdLst>
   <p:sldIdLst>
     <p:sldId id="256" r:id="rId2"/>
@@ -19,8 +19,9 @@
     <p:sldId id="280" r:id="rId10"/>
     <p:sldId id="275" r:id="rId11"/>
     <p:sldId id="271" r:id="rId12"/>
-    <p:sldId id="279" r:id="rId13"/>
-    <p:sldId id="274" r:id="rId14"/>
+    <p:sldId id="282" r:id="rId13"/>
+    <p:sldId id="279" r:id="rId14"/>
+    <p:sldId id="274" r:id="rId15"/>
   </p:sldIdLst>
   <p:sldSz cx="12192000" cy="6858000"/>
   <p:notesSz cx="9312275" cy="6858000"/>
@@ -120,6 +121,28 @@
     </a:lvl9pPr>
   </p:defaultTextStyle>
   <p:extLst>
+    <p:ext uri="{521415D9-36F7-43E2-AB2F-B90AF26B5E84}">
+      <p14:sectionLst xmlns:p14="http://schemas.microsoft.com/office/powerpoint/2010/main">
+        <p14:section name="Default Section" id="{05B10BA0-4BB3-4CBB-96EC-CED32FE450F0}">
+          <p14:sldIdLst>
+            <p14:sldId id="256"/>
+            <p14:sldId id="277"/>
+            <p14:sldId id="265"/>
+            <p14:sldId id="267"/>
+            <p14:sldId id="278"/>
+            <p14:sldId id="273"/>
+            <p14:sldId id="268"/>
+            <p14:sldId id="281"/>
+            <p14:sldId id="280"/>
+            <p14:sldId id="275"/>
+            <p14:sldId id="271"/>
+            <p14:sldId id="282"/>
+            <p14:sldId id="279"/>
+            <p14:sldId id="274"/>
+          </p14:sldIdLst>
+        </p14:section>
+      </p14:sectionLst>
+    </p:ext>
     <p:ext uri="{EFAFB233-063F-42B5-8137-9DF3F51BA10A}">
       <p15:sldGuideLst xmlns:p15="http://schemas.microsoft.com/office/powerpoint/2012/main"/>
     </p:ext>
@@ -4283,7 +4306,7 @@
           <a:graphicData uri="http://schemas.openxmlformats.org/presentationml/2006/ole">
             <mc:AlternateContent xmlns:mc="http://schemas.openxmlformats.org/markup-compatibility/2006">
               <mc:Choice xmlns:v="urn:schemas-microsoft-com:vml" Requires="v">
-                <p:oleObj spid="_x0000_s2064" r:id="rId4" imgW="9401254" imgH="7181837" progId="Visio.Drawing.15">
+                <p:oleObj spid="_x0000_s2065" r:id="rId4" imgW="9401254" imgH="7181837" progId="Visio.Drawing.15">
                   <p:embed/>
                 </p:oleObj>
               </mc:Choice>
@@ -4711,7 +4734,7 @@
           <a:graphicData uri="http://schemas.openxmlformats.org/presentationml/2006/ole">
             <mc:AlternateContent xmlns:mc="http://schemas.openxmlformats.org/markup-compatibility/2006">
               <mc:Choice xmlns:v="urn:schemas-microsoft-com:vml" Requires="v">
-                <p:oleObj spid="_x0000_s3087" r:id="rId4" imgW="7181902" imgH="4381327" progId="Visio.Drawing.15">
+                <p:oleObj spid="_x0000_s3088" r:id="rId4" imgW="7181902" imgH="4381327" progId="Visio.Drawing.15">
                   <p:embed/>
                 </p:oleObj>
               </mc:Choice>
@@ -4827,7 +4850,7 @@
 </file>
 
 <file path=ppt/slides/slide12.xml><?xml version="1.0" encoding="utf-8"?>
-<p:sld xmlns:a="http://schemas.openxmlformats.org/drawingml/2006/main" xmlns:r="http://schemas.openxmlformats.org/officeDocument/2006/relationships" xmlns:p="http://schemas.openxmlformats.org/presentationml/2006/main">
+<p:sld xmlns:a="http://schemas.openxmlformats.org/drawingml/2006/main" xmlns:r="http://schemas.openxmlformats.org/officeDocument/2006/relationships" xmlns:p="http://schemas.openxmlformats.org/presentationml/2006/main" showMasterSp="0">
   <p:cSld>
     <p:spTree>
       <p:nvGrpSpPr>
@@ -4845,119 +4868,7 @@
       </p:grpSpPr>
       <p:sp>
         <p:nvSpPr>
-          <p:cNvPr id="4" name="Title 3"/>
-          <p:cNvSpPr>
-            <a:spLocks noGrp="1"/>
-          </p:cNvSpPr>
-          <p:nvPr>
-            <p:ph type="title"/>
-          </p:nvPr>
-        </p:nvSpPr>
-        <p:spPr/>
-        <p:txBody>
-          <a:bodyPr/>
-          <a:lstStyle/>
-          <a:p>
-            <a:r>
-              <a:rPr lang="en-US" dirty="0" smtClean="0"/>
-              <a:t>Technical Specifications continued</a:t>
-            </a:r>
-            <a:endParaRPr lang="en-US" dirty="0"/>
-          </a:p>
-        </p:txBody>
-      </p:sp>
-      <p:sp>
-        <p:nvSpPr>
-          <p:cNvPr id="5" name="Content Placeholder 4"/>
-          <p:cNvSpPr>
-            <a:spLocks noGrp="1"/>
-          </p:cNvSpPr>
-          <p:nvPr>
-            <p:ph idx="1"/>
-          </p:nvPr>
-        </p:nvSpPr>
-        <p:spPr/>
-        <p:txBody>
-          <a:bodyPr>
-            <a:normAutofit/>
-          </a:bodyPr>
-          <a:lstStyle/>
-          <a:p>
-            <a:pPr lvl="1">
-              <a:buFont typeface="Courier New" panose="02070309020205020404" pitchFamily="49" charset="0"/>
-              <a:buChar char="o"/>
-            </a:pPr>
-            <a:r>
-              <a:rPr lang="en-US" sz="2800" dirty="0" smtClean="0"/>
-              <a:t>Artificial Intelligence</a:t>
-            </a:r>
-          </a:p>
-          <a:p>
-            <a:pPr lvl="2">
-              <a:buFont typeface="Courier New" panose="02070309020205020404" pitchFamily="49" charset="0"/>
-              <a:buChar char="o"/>
-            </a:pPr>
-            <a:r>
-              <a:rPr lang="en-US" sz="2800" dirty="0" smtClean="0"/>
-              <a:t>Vision Range</a:t>
-            </a:r>
-          </a:p>
-          <a:p>
-            <a:pPr lvl="2">
-              <a:buFont typeface="Courier New" panose="02070309020205020404" pitchFamily="49" charset="0"/>
-              <a:buChar char="o"/>
-            </a:pPr>
-            <a:r>
-              <a:rPr lang="en-US" sz="2800" dirty="0" smtClean="0"/>
-              <a:t>Return Range</a:t>
-            </a:r>
-          </a:p>
-          <a:p>
-            <a:pPr lvl="2">
-              <a:buFont typeface="Courier New" panose="02070309020205020404" pitchFamily="49" charset="0"/>
-              <a:buChar char="o"/>
-            </a:pPr>
-            <a:r>
-              <a:rPr lang="en-US" sz="2800" dirty="0" smtClean="0"/>
-              <a:t>Waypoints</a:t>
-            </a:r>
-          </a:p>
-          <a:p>
-            <a:pPr lvl="1">
-              <a:buFont typeface="Courier New" panose="02070309020205020404" pitchFamily="49" charset="0"/>
-              <a:buChar char="o"/>
-            </a:pPr>
-            <a:r>
-              <a:rPr lang="en-US" sz="2800" dirty="0" smtClean="0"/>
-              <a:t>Hardware Architecture</a:t>
-            </a:r>
-          </a:p>
-          <a:p>
-            <a:pPr lvl="2">
-              <a:buFont typeface="Courier New" panose="02070309020205020404" pitchFamily="49" charset="0"/>
-              <a:buChar char="o"/>
-            </a:pPr>
-            <a:r>
-              <a:rPr lang="en-US" sz="2800" dirty="0" smtClean="0"/>
-              <a:t>I/O devices </a:t>
-            </a:r>
-          </a:p>
-          <a:p>
-            <a:pPr lvl="2">
-              <a:buFont typeface="Courier New" panose="02070309020205020404" pitchFamily="49" charset="0"/>
-              <a:buChar char="o"/>
-            </a:pPr>
-            <a:r>
-              <a:rPr lang="en-US" sz="2800" dirty="0" smtClean="0"/>
-              <a:t>PC</a:t>
-            </a:r>
-            <a:endParaRPr lang="en-US" sz="2800" dirty="0"/>
-          </a:p>
-        </p:txBody>
-      </p:sp>
-      <p:sp>
-        <p:nvSpPr>
-          <p:cNvPr id="6" name="Rectangle 2"/>
+          <p:cNvPr id="4" name="Rectangle 2"/>
           <p:cNvSpPr>
             <a:spLocks noChangeArrowheads="1"/>
           </p:cNvSpPr>
@@ -4965,8 +4876,8 @@
         </p:nvSpPr>
         <p:spPr bwMode="auto">
           <a:xfrm>
-            <a:off x="4470399" y="1845733"/>
-            <a:ext cx="12874161" cy="45719"/>
+            <a:off x="0" y="0"/>
+            <a:ext cx="12192000" cy="0"/>
           </a:xfrm>
           <a:prstGeom prst="rect">
             <a:avLst/>
@@ -5006,6 +4917,307 @@
           </a:extLst>
         </p:spPr>
         <p:txBody>
+          <a:bodyPr vert="horz" wrap="none" lIns="91440" tIns="45720" rIns="91440" bIns="45720" numCol="1" anchor="ctr" anchorCtr="0" compatLnSpc="1">
+            <a:prstTxWarp prst="textNoShape">
+              <a:avLst/>
+            </a:prstTxWarp>
+            <a:spAutoFit/>
+          </a:bodyPr>
+          <a:lstStyle/>
+          <a:p>
+            <a:endParaRPr lang="en-US"/>
+          </a:p>
+        </p:txBody>
+      </p:sp>
+      <p:graphicFrame>
+        <p:nvGraphicFramePr>
+          <p:cNvPr id="5" name="Object 4"/>
+          <p:cNvGraphicFramePr>
+            <a:graphicFrameLocks noChangeAspect="1"/>
+          </p:cNvGraphicFramePr>
+          <p:nvPr>
+            <p:extLst>
+              <p:ext uri="{D42A27DB-BD31-4B8C-83A1-F6EECF244321}">
+                <p14:modId xmlns:p14="http://schemas.microsoft.com/office/powerpoint/2010/main" val="1364375965"/>
+              </p:ext>
+            </p:extLst>
+          </p:nvPr>
+        </p:nvGraphicFramePr>
+        <p:xfrm>
+          <a:off x="942107" y="725378"/>
+          <a:ext cx="9425509" cy="6132622"/>
+        </p:xfrm>
+        <a:graphic>
+          <a:graphicData uri="http://schemas.openxmlformats.org/presentationml/2006/ole">
+            <mc:AlternateContent xmlns:mc="http://schemas.openxmlformats.org/markup-compatibility/2006">
+              <mc:Choice xmlns:v="urn:schemas-microsoft-com:vml" Requires="v">
+                <p:oleObj spid="_x0000_s8195" name="Visio" r:id="rId3" imgW="8829619" imgH="5743455" progId="Visio.Drawing.15">
+                  <p:embed/>
+                </p:oleObj>
+              </mc:Choice>
+              <mc:Fallback>
+                <p:oleObj name="Visio" r:id="rId3" imgW="8829619" imgH="5743455" progId="Visio.Drawing.15">
+                  <p:embed/>
+                  <p:pic>
+                    <p:nvPicPr>
+                      <p:cNvPr id="0" name="Object 1"/>
+                      <p:cNvPicPr>
+                        <a:picLocks noChangeAspect="1" noChangeArrowheads="1"/>
+                      </p:cNvPicPr>
+                      <p:nvPr/>
+                    </p:nvPicPr>
+                    <p:blipFill>
+                      <a:blip r:embed="rId4">
+                        <a:extLst>
+                          <a:ext uri="{28A0092B-C50C-407E-A947-70E740481C1C}">
+                            <a14:useLocalDpi xmlns:a14="http://schemas.microsoft.com/office/drawing/2010/main" val="0"/>
+                          </a:ext>
+                        </a:extLst>
+                      </a:blip>
+                      <a:srcRect/>
+                      <a:stretch>
+                        <a:fillRect/>
+                      </a:stretch>
+                    </p:blipFill>
+                    <p:spPr bwMode="auto">
+                      <a:xfrm>
+                        <a:off x="942107" y="725378"/>
+                        <a:ext cx="9425509" cy="6132622"/>
+                      </a:xfrm>
+                      <a:prstGeom prst="rect">
+                        <a:avLst/>
+                      </a:prstGeom>
+                      <a:noFill/>
+                    </p:spPr>
+                  </p:pic>
+                </p:oleObj>
+              </mc:Fallback>
+            </mc:AlternateContent>
+          </a:graphicData>
+        </a:graphic>
+      </p:graphicFrame>
+      <p:sp>
+        <p:nvSpPr>
+          <p:cNvPr id="16" name="Title 15"/>
+          <p:cNvSpPr>
+            <a:spLocks noGrp="1"/>
+          </p:cNvSpPr>
+          <p:nvPr>
+            <p:ph type="title"/>
+          </p:nvPr>
+        </p:nvSpPr>
+        <p:spPr>
+          <a:xfrm>
+            <a:off x="942107" y="-725379"/>
+            <a:ext cx="10058400" cy="1450757"/>
+          </a:xfrm>
+        </p:spPr>
+        <p:txBody>
+          <a:bodyPr/>
+          <a:lstStyle/>
+          <a:p>
+            <a:pPr algn="ctr"/>
+            <a:r>
+              <a:rPr lang="en-US" dirty="0" smtClean="0"/>
+              <a:t>Software Architecture</a:t>
+            </a:r>
+            <a:endParaRPr lang="en-US" dirty="0"/>
+          </a:p>
+        </p:txBody>
+      </p:sp>
+    </p:spTree>
+    <p:extLst>
+      <p:ext uri="{BB962C8B-B14F-4D97-AF65-F5344CB8AC3E}">
+        <p14:creationId xmlns:p14="http://schemas.microsoft.com/office/powerpoint/2010/main" val="3896772744"/>
+      </p:ext>
+    </p:extLst>
+  </p:cSld>
+  <p:clrMapOvr>
+    <a:masterClrMapping/>
+  </p:clrMapOvr>
+</p:sld>
+</file>
+
+<file path=ppt/slides/slide13.xml><?xml version="1.0" encoding="utf-8"?>
+<p:sld xmlns:a="http://schemas.openxmlformats.org/drawingml/2006/main" xmlns:r="http://schemas.openxmlformats.org/officeDocument/2006/relationships" xmlns:p="http://schemas.openxmlformats.org/presentationml/2006/main">
+  <p:cSld>
+    <p:spTree>
+      <p:nvGrpSpPr>
+        <p:cNvPr id="1" name=""/>
+        <p:cNvGrpSpPr/>
+        <p:nvPr/>
+      </p:nvGrpSpPr>
+      <p:grpSpPr>
+        <a:xfrm>
+          <a:off x="0" y="0"/>
+          <a:ext cx="0" cy="0"/>
+          <a:chOff x="0" y="0"/>
+          <a:chExt cx="0" cy="0"/>
+        </a:xfrm>
+      </p:grpSpPr>
+      <p:sp>
+        <p:nvSpPr>
+          <p:cNvPr id="4" name="Title 3"/>
+          <p:cNvSpPr>
+            <a:spLocks noGrp="1"/>
+          </p:cNvSpPr>
+          <p:nvPr>
+            <p:ph type="title"/>
+          </p:nvPr>
+        </p:nvSpPr>
+        <p:spPr/>
+        <p:txBody>
+          <a:bodyPr/>
+          <a:lstStyle/>
+          <a:p>
+            <a:r>
+              <a:rPr lang="en-US" dirty="0" smtClean="0"/>
+              <a:t>Technical Specifications continued</a:t>
+            </a:r>
+            <a:endParaRPr lang="en-US" dirty="0"/>
+          </a:p>
+        </p:txBody>
+      </p:sp>
+      <p:sp>
+        <p:nvSpPr>
+          <p:cNvPr id="5" name="Content Placeholder 4"/>
+          <p:cNvSpPr>
+            <a:spLocks noGrp="1"/>
+          </p:cNvSpPr>
+          <p:nvPr>
+            <p:ph idx="1"/>
+          </p:nvPr>
+        </p:nvSpPr>
+        <p:spPr/>
+        <p:txBody>
+          <a:bodyPr>
+            <a:normAutofit/>
+          </a:bodyPr>
+          <a:lstStyle/>
+          <a:p>
+            <a:pPr lvl="1">
+              <a:buFont typeface="Courier New" panose="02070309020205020404" pitchFamily="49" charset="0"/>
+              <a:buChar char="o"/>
+            </a:pPr>
+            <a:r>
+              <a:rPr lang="en-US" sz="2800" dirty="0" smtClean="0"/>
+              <a:t>Artificial Intelligence</a:t>
+            </a:r>
+          </a:p>
+          <a:p>
+            <a:pPr lvl="2">
+              <a:buFont typeface="Courier New" panose="02070309020205020404" pitchFamily="49" charset="0"/>
+              <a:buChar char="o"/>
+            </a:pPr>
+            <a:r>
+              <a:rPr lang="en-US" sz="2800" dirty="0" smtClean="0"/>
+              <a:t>Vision Range</a:t>
+            </a:r>
+          </a:p>
+          <a:p>
+            <a:pPr lvl="2">
+              <a:buFont typeface="Courier New" panose="02070309020205020404" pitchFamily="49" charset="0"/>
+              <a:buChar char="o"/>
+            </a:pPr>
+            <a:r>
+              <a:rPr lang="en-US" sz="2800" dirty="0" smtClean="0"/>
+              <a:t>Return Range</a:t>
+            </a:r>
+          </a:p>
+          <a:p>
+            <a:pPr lvl="2">
+              <a:buFont typeface="Courier New" panose="02070309020205020404" pitchFamily="49" charset="0"/>
+              <a:buChar char="o"/>
+            </a:pPr>
+            <a:r>
+              <a:rPr lang="en-US" sz="2800" dirty="0" smtClean="0"/>
+              <a:t>Waypoints</a:t>
+            </a:r>
+          </a:p>
+          <a:p>
+            <a:pPr lvl="1">
+              <a:buFont typeface="Courier New" panose="02070309020205020404" pitchFamily="49" charset="0"/>
+              <a:buChar char="o"/>
+            </a:pPr>
+            <a:r>
+              <a:rPr lang="en-US" sz="2800" dirty="0" smtClean="0"/>
+              <a:t>Hardware Architecture</a:t>
+            </a:r>
+          </a:p>
+          <a:p>
+            <a:pPr lvl="2">
+              <a:buFont typeface="Courier New" panose="02070309020205020404" pitchFamily="49" charset="0"/>
+              <a:buChar char="o"/>
+            </a:pPr>
+            <a:r>
+              <a:rPr lang="en-US" sz="2800" dirty="0" smtClean="0"/>
+              <a:t>I/O devices </a:t>
+            </a:r>
+          </a:p>
+          <a:p>
+            <a:pPr lvl="2">
+              <a:buFont typeface="Courier New" panose="02070309020205020404" pitchFamily="49" charset="0"/>
+              <a:buChar char="o"/>
+            </a:pPr>
+            <a:r>
+              <a:rPr lang="en-US" sz="2800" dirty="0" smtClean="0"/>
+              <a:t>PC</a:t>
+            </a:r>
+            <a:endParaRPr lang="en-US" sz="2800" dirty="0"/>
+          </a:p>
+        </p:txBody>
+      </p:sp>
+      <p:sp>
+        <p:nvSpPr>
+          <p:cNvPr id="6" name="Rectangle 2"/>
+          <p:cNvSpPr>
+            <a:spLocks noChangeArrowheads="1"/>
+          </p:cNvSpPr>
+          <p:nvPr/>
+        </p:nvSpPr>
+        <p:spPr bwMode="auto">
+          <a:xfrm>
+            <a:off x="4470399" y="1845733"/>
+            <a:ext cx="12874161" cy="45719"/>
+          </a:xfrm>
+          <a:prstGeom prst="rect">
+            <a:avLst/>
+          </a:prstGeom>
+          <a:noFill/>
+          <a:ln>
+            <a:noFill/>
+          </a:ln>
+          <a:effectLst/>
+          <a:extLst>
+            <a:ext uri="{909E8E84-426E-40DD-AFC4-6F175D3DCCD1}">
+              <a14:hiddenFill xmlns:a14="http://schemas.microsoft.com/office/drawing/2010/main">
+                <a:solidFill>
+                  <a:schemeClr val="accent1"/>
+                </a:solidFill>
+              </a14:hiddenFill>
+            </a:ext>
+            <a:ext uri="{91240B29-F687-4F45-9708-019B960494DF}">
+              <a14:hiddenLine xmlns:a14="http://schemas.microsoft.com/office/drawing/2010/main" w="9525">
+                <a:solidFill>
+                  <a:schemeClr val="tx1"/>
+                </a:solidFill>
+                <a:miter lim="800000"/>
+                <a:headEnd/>
+                <a:tailEnd/>
+              </a14:hiddenLine>
+            </a:ext>
+            <a:ext uri="{AF507438-7753-43E0-B8FC-AC1667EBCBE1}">
+              <a14:hiddenEffects xmlns:a14="http://schemas.microsoft.com/office/drawing/2010/main">
+                <a:effectLst>
+                  <a:outerShdw dist="35921" dir="2700000" algn="ctr" rotWithShape="0">
+                    <a:schemeClr val="bg2"/>
+                  </a:outerShdw>
+                </a:effectLst>
+              </a14:hiddenEffects>
+            </a:ext>
+          </a:extLst>
+        </p:spPr>
+        <p:txBody>
           <a:bodyPr vert="horz" wrap="square" lIns="91440" tIns="45720" rIns="91440" bIns="45720" numCol="1" anchor="ctr" anchorCtr="0" compatLnSpc="1">
             <a:prstTxWarp prst="textNoShape">
               <a:avLst/>
@@ -5040,7 +5252,7 @@
           <a:graphicData uri="http://schemas.openxmlformats.org/presentationml/2006/ole">
             <mc:AlternateContent xmlns:mc="http://schemas.openxmlformats.org/markup-compatibility/2006">
               <mc:Choice xmlns:v="urn:schemas-microsoft-com:vml" Requires="v">
-                <p:oleObj spid="_x0000_s4111" r:id="rId4" imgW="5848208" imgH="3009847" progId="Visio.Drawing.15">
+                <p:oleObj spid="_x0000_s4112" r:id="rId4" imgW="5848208" imgH="3009847" progId="Visio.Drawing.15">
                   <p:embed/>
                 </p:oleObj>
               </mc:Choice>
@@ -5148,7 +5360,7 @@
 </p:sld>
 </file>
 
-<file path=ppt/slides/slide13.xml><?xml version="1.0" encoding="utf-8"?>
+<file path=ppt/slides/slide14.xml><?xml version="1.0" encoding="utf-8"?>
 <p:sld xmlns:a="http://schemas.openxmlformats.org/drawingml/2006/main" xmlns:r="http://schemas.openxmlformats.org/officeDocument/2006/relationships" xmlns:p="http://schemas.openxmlformats.org/presentationml/2006/main">
   <p:cSld>
     <p:spTree>
@@ -5180,8 +5392,8 @@
         </p:blipFill>
         <p:spPr>
           <a:xfrm>
-            <a:off x="5021177" y="1063374"/>
-            <a:ext cx="6920917" cy="5452083"/>
+            <a:off x="4170440" y="594359"/>
+            <a:ext cx="7966140" cy="6138951"/>
           </a:xfrm>
           <a:prstGeom prst="rect">
             <a:avLst/>
@@ -5478,36 +5690,6 @@
           </a:p>
         </p:txBody>
       </p:sp>
-      <p:pic>
-        <p:nvPicPr>
-          <p:cNvPr id="7" name="Picture 6"/>
-          <p:cNvPicPr>
-            <a:picLocks noChangeAspect="1"/>
-          </p:cNvPicPr>
-          <p:nvPr/>
-        </p:nvPicPr>
-        <p:blipFill>
-          <a:blip r:embed="rId3">
-            <a:extLst>
-              <a:ext uri="{28A0092B-C50C-407E-A947-70E740481C1C}">
-                <a14:useLocalDpi xmlns:a14="http://schemas.microsoft.com/office/drawing/2010/main" val="0"/>
-              </a:ext>
-            </a:extLst>
-          </a:blip>
-          <a:stretch>
-            <a:fillRect/>
-          </a:stretch>
-        </p:blipFill>
-        <p:spPr>
-          <a:xfrm>
-            <a:off x="4415386" y="482656"/>
-            <a:ext cx="605791" cy="856875"/>
-          </a:xfrm>
-          <a:prstGeom prst="rect">
-            <a:avLst/>
-          </a:prstGeom>
-        </p:spPr>
-      </p:pic>
     </p:spTree>
     <p:extLst>
       <p:ext uri="{BB962C8B-B14F-4D97-AF65-F5344CB8AC3E}">
@@ -6395,20 +6577,20 @@
           <p:nvPr>
             <p:extLst>
               <p:ext uri="{D42A27DB-BD31-4B8C-83A1-F6EECF244321}">
-                <p14:modId xmlns:p14="http://schemas.microsoft.com/office/powerpoint/2010/main" val="4285095334"/>
+                <p14:modId xmlns:p14="http://schemas.microsoft.com/office/powerpoint/2010/main" val="1477575976"/>
               </p:ext>
             </p:extLst>
           </p:nvPr>
         </p:nvGraphicFramePr>
         <p:xfrm>
-          <a:off x="4734889" y="490085"/>
-          <a:ext cx="6430417" cy="5922753"/>
+          <a:off x="4455492" y="206615"/>
+          <a:ext cx="7736507" cy="6651385"/>
         </p:xfrm>
         <a:graphic>
           <a:graphicData uri="http://schemas.openxmlformats.org/presentationml/2006/ole">
             <mc:AlternateContent xmlns:mc="http://schemas.openxmlformats.org/markup-compatibility/2006">
               <mc:Choice xmlns:v="urn:schemas-microsoft-com:vml" Requires="v">
-                <p:oleObj spid="_x0000_s1043" r:id="rId4" imgW="6639011" imgH="6105658" progId="Visio.Drawing.15">
+                <p:oleObj spid="_x0000_s1044" r:id="rId4" imgW="6639011" imgH="6105658" progId="Visio.Drawing.15">
                   <p:embed/>
                 </p:oleObj>
               </mc:Choice>
@@ -6438,8 +6620,8 @@
                     </p:blipFill>
                     <p:spPr bwMode="auto">
                       <a:xfrm>
-                        <a:off x="4734889" y="490085"/>
-                        <a:ext cx="6430417" cy="5922753"/>
+                        <a:off x="4455492" y="206615"/>
+                        <a:ext cx="7736507" cy="6651385"/>
                       </a:xfrm>
                       <a:prstGeom prst="rect">
                         <a:avLst/>
@@ -7319,7 +7501,7 @@
           <a:graphicData uri="http://schemas.openxmlformats.org/presentationml/2006/ole">
             <mc:AlternateContent xmlns:mc="http://schemas.openxmlformats.org/markup-compatibility/2006">
               <mc:Choice xmlns:v="urn:schemas-microsoft-com:vml" Requires="v">
-                <p:oleObj spid="_x0000_s7174" r:id="rId4" imgW="8886746" imgH="6800930" progId="Visio.Drawing.15">
+                <p:oleObj spid="_x0000_s7175" r:id="rId4" imgW="8886746" imgH="6800930" progId="Visio.Drawing.15">
                   <p:embed/>
                 </p:oleObj>
               </mc:Choice>

</xml_diff>